<commit_message>
add split to slide 9
</commit_message>
<xml_diff>
--- a/Slides/KNN/KNN Algorithm.pptx
+++ b/Slides/KNN/KNN Algorithm.pptx
@@ -13,10 +13,11 @@
     <p:sldId id="263" r:id="rId7"/>
     <p:sldId id="262" r:id="rId8"/>
     <p:sldId id="265" r:id="rId9"/>
-    <p:sldId id="264" r:id="rId10"/>
-    <p:sldId id="266" r:id="rId11"/>
-    <p:sldId id="267" r:id="rId12"/>
-    <p:sldId id="268" r:id="rId13"/>
+    <p:sldId id="269" r:id="rId10"/>
+    <p:sldId id="264" r:id="rId11"/>
+    <p:sldId id="266" r:id="rId12"/>
+    <p:sldId id="267" r:id="rId13"/>
+    <p:sldId id="268" r:id="rId14"/>
   </p:sldIdLst>
   <p:sldSz cx="12192000" cy="6858000"/>
   <p:notesSz cx="6858000" cy="9144000"/>
@@ -3221,7 +3222,7 @@
         <a:bodyPr/>
         <a:lstStyle/>
         <a:p>
-          <a:endParaRPr lang="en-US">
+          <a:endParaRPr lang="en-US" dirty="0">
             <a:solidFill>
               <a:schemeClr val="bg1"/>
             </a:solidFill>
@@ -3347,7 +3348,7 @@
         <a:bodyPr/>
         <a:lstStyle/>
         <a:p>
-          <a:endParaRPr lang="en-US">
+          <a:endParaRPr lang="en-US" dirty="0">
             <a:solidFill>
               <a:schemeClr val="bg1"/>
             </a:solidFill>
@@ -4555,7 +4556,7 @@
             </a:spcAft>
             <a:buNone/>
           </a:pPr>
-          <a:endParaRPr lang="en-US" sz="3200" kern="1200">
+          <a:endParaRPr lang="en-US" sz="3200" kern="1200" dirty="0">
             <a:solidFill>
               <a:schemeClr val="bg1"/>
             </a:solidFill>
@@ -4779,7 +4780,7 @@
             </a:spcAft>
             <a:buNone/>
           </a:pPr>
-          <a:endParaRPr lang="en-US" sz="3200" kern="1200">
+          <a:endParaRPr lang="en-US" sz="3200" kern="1200" dirty="0">
             <a:solidFill>
               <a:schemeClr val="bg1"/>
             </a:solidFill>
@@ -8432,9 +8433,9 @@
           <a:p>
             <a:fld id="{54E41A0C-13FA-495A-8B36-F957F571954B}" type="datetimeFigureOut">
               <a:rPr lang="en-US" smtClean="0"/>
-              <a:t>10/26/2025</a:t>
+              <a:t>10/28/2025</a:t>
             </a:fld>
-            <a:endParaRPr lang="en-US"/>
+            <a:endParaRPr lang="en-US" dirty="0"/>
           </a:p>
         </p:txBody>
       </p:sp>
@@ -8459,7 +8460,7 @@
           <a:bodyPr/>
           <a:lstStyle/>
           <a:p>
-            <a:endParaRPr lang="en-US"/>
+            <a:endParaRPr lang="en-US" dirty="0"/>
           </a:p>
         </p:txBody>
       </p:sp>
@@ -8488,7 +8489,7 @@
               <a:rPr lang="en-US" smtClean="0"/>
               <a:t>‹#›</a:t>
             </a:fld>
-            <a:endParaRPr lang="en-US"/>
+            <a:endParaRPr lang="en-US" dirty="0"/>
           </a:p>
         </p:txBody>
       </p:sp>
@@ -8630,9 +8631,9 @@
           <a:p>
             <a:fld id="{54E41A0C-13FA-495A-8B36-F957F571954B}" type="datetimeFigureOut">
               <a:rPr lang="en-US" smtClean="0"/>
-              <a:t>10/26/2025</a:t>
+              <a:t>10/28/2025</a:t>
             </a:fld>
-            <a:endParaRPr lang="en-US"/>
+            <a:endParaRPr lang="en-US" dirty="0"/>
           </a:p>
         </p:txBody>
       </p:sp>
@@ -8657,7 +8658,7 @@
           <a:bodyPr/>
           <a:lstStyle/>
           <a:p>
-            <a:endParaRPr lang="en-US"/>
+            <a:endParaRPr lang="en-US" dirty="0"/>
           </a:p>
         </p:txBody>
       </p:sp>
@@ -8686,7 +8687,7 @@
               <a:rPr lang="en-US" smtClean="0"/>
               <a:t>‹#›</a:t>
             </a:fld>
-            <a:endParaRPr lang="en-US"/>
+            <a:endParaRPr lang="en-US" dirty="0"/>
           </a:p>
         </p:txBody>
       </p:sp>
@@ -8838,9 +8839,9 @@
           <a:p>
             <a:fld id="{54E41A0C-13FA-495A-8B36-F957F571954B}" type="datetimeFigureOut">
               <a:rPr lang="en-US" smtClean="0"/>
-              <a:t>10/26/2025</a:t>
+              <a:t>10/28/2025</a:t>
             </a:fld>
-            <a:endParaRPr lang="en-US"/>
+            <a:endParaRPr lang="en-US" dirty="0"/>
           </a:p>
         </p:txBody>
       </p:sp>
@@ -8865,7 +8866,7 @@
           <a:bodyPr/>
           <a:lstStyle/>
           <a:p>
-            <a:endParaRPr lang="en-US"/>
+            <a:endParaRPr lang="en-US" dirty="0"/>
           </a:p>
         </p:txBody>
       </p:sp>
@@ -8894,7 +8895,7 @@
               <a:rPr lang="en-US" smtClean="0"/>
               <a:t>‹#›</a:t>
             </a:fld>
-            <a:endParaRPr lang="en-US"/>
+            <a:endParaRPr lang="en-US" dirty="0"/>
           </a:p>
         </p:txBody>
       </p:sp>
@@ -9036,9 +9037,9 @@
           <a:p>
             <a:fld id="{54E41A0C-13FA-495A-8B36-F957F571954B}" type="datetimeFigureOut">
               <a:rPr lang="en-US" smtClean="0"/>
-              <a:t>10/26/2025</a:t>
+              <a:t>10/28/2025</a:t>
             </a:fld>
-            <a:endParaRPr lang="en-US"/>
+            <a:endParaRPr lang="en-US" dirty="0"/>
           </a:p>
         </p:txBody>
       </p:sp>
@@ -9063,7 +9064,7 @@
           <a:bodyPr/>
           <a:lstStyle/>
           <a:p>
-            <a:endParaRPr lang="en-US"/>
+            <a:endParaRPr lang="en-US" dirty="0"/>
           </a:p>
         </p:txBody>
       </p:sp>
@@ -9092,7 +9093,7 @@
               <a:rPr lang="en-US" smtClean="0"/>
               <a:t>‹#›</a:t>
             </a:fld>
-            <a:endParaRPr lang="en-US"/>
+            <a:endParaRPr lang="en-US" dirty="0"/>
           </a:p>
         </p:txBody>
       </p:sp>
@@ -9311,9 +9312,9 @@
           <a:p>
             <a:fld id="{54E41A0C-13FA-495A-8B36-F957F571954B}" type="datetimeFigureOut">
               <a:rPr lang="en-US" smtClean="0"/>
-              <a:t>10/26/2025</a:t>
+              <a:t>10/28/2025</a:t>
             </a:fld>
-            <a:endParaRPr lang="en-US"/>
+            <a:endParaRPr lang="en-US" dirty="0"/>
           </a:p>
         </p:txBody>
       </p:sp>
@@ -9338,7 +9339,7 @@
           <a:bodyPr/>
           <a:lstStyle/>
           <a:p>
-            <a:endParaRPr lang="en-US"/>
+            <a:endParaRPr lang="en-US" dirty="0"/>
           </a:p>
         </p:txBody>
       </p:sp>
@@ -9367,7 +9368,7 @@
               <a:rPr lang="en-US" smtClean="0"/>
               <a:t>‹#›</a:t>
             </a:fld>
-            <a:endParaRPr lang="en-US"/>
+            <a:endParaRPr lang="en-US" dirty="0"/>
           </a:p>
         </p:txBody>
       </p:sp>
@@ -9576,9 +9577,9 @@
           <a:p>
             <a:fld id="{54E41A0C-13FA-495A-8B36-F957F571954B}" type="datetimeFigureOut">
               <a:rPr lang="en-US" smtClean="0"/>
-              <a:t>10/26/2025</a:t>
+              <a:t>10/28/2025</a:t>
             </a:fld>
-            <a:endParaRPr lang="en-US"/>
+            <a:endParaRPr lang="en-US" dirty="0"/>
           </a:p>
         </p:txBody>
       </p:sp>
@@ -9603,7 +9604,7 @@
           <a:bodyPr/>
           <a:lstStyle/>
           <a:p>
-            <a:endParaRPr lang="en-US"/>
+            <a:endParaRPr lang="en-US" dirty="0"/>
           </a:p>
         </p:txBody>
       </p:sp>
@@ -9632,7 +9633,7 @@
               <a:rPr lang="en-US" smtClean="0"/>
               <a:t>‹#›</a:t>
             </a:fld>
-            <a:endParaRPr lang="en-US"/>
+            <a:endParaRPr lang="en-US" dirty="0"/>
           </a:p>
         </p:txBody>
       </p:sp>
@@ -9988,9 +9989,9 @@
           <a:p>
             <a:fld id="{54E41A0C-13FA-495A-8B36-F957F571954B}" type="datetimeFigureOut">
               <a:rPr lang="en-US" smtClean="0"/>
-              <a:t>10/26/2025</a:t>
+              <a:t>10/28/2025</a:t>
             </a:fld>
-            <a:endParaRPr lang="en-US"/>
+            <a:endParaRPr lang="en-US" dirty="0"/>
           </a:p>
         </p:txBody>
       </p:sp>
@@ -10015,7 +10016,7 @@
           <a:bodyPr/>
           <a:lstStyle/>
           <a:p>
-            <a:endParaRPr lang="en-US"/>
+            <a:endParaRPr lang="en-US" dirty="0"/>
           </a:p>
         </p:txBody>
       </p:sp>
@@ -10044,7 +10045,7 @@
               <a:rPr lang="en-US" smtClean="0"/>
               <a:t>‹#›</a:t>
             </a:fld>
-            <a:endParaRPr lang="en-US"/>
+            <a:endParaRPr lang="en-US" dirty="0"/>
           </a:p>
         </p:txBody>
       </p:sp>
@@ -10129,9 +10130,9 @@
           <a:p>
             <a:fld id="{54E41A0C-13FA-495A-8B36-F957F571954B}" type="datetimeFigureOut">
               <a:rPr lang="en-US" smtClean="0"/>
-              <a:t>10/26/2025</a:t>
+              <a:t>10/28/2025</a:t>
             </a:fld>
-            <a:endParaRPr lang="en-US"/>
+            <a:endParaRPr lang="en-US" dirty="0"/>
           </a:p>
         </p:txBody>
       </p:sp>
@@ -10156,7 +10157,7 @@
           <a:bodyPr/>
           <a:lstStyle/>
           <a:p>
-            <a:endParaRPr lang="en-US"/>
+            <a:endParaRPr lang="en-US" dirty="0"/>
           </a:p>
         </p:txBody>
       </p:sp>
@@ -10185,7 +10186,7 @@
               <a:rPr lang="en-US" smtClean="0"/>
               <a:t>‹#›</a:t>
             </a:fld>
-            <a:endParaRPr lang="en-US"/>
+            <a:endParaRPr lang="en-US" dirty="0"/>
           </a:p>
         </p:txBody>
       </p:sp>
@@ -10242,9 +10243,9 @@
           <a:p>
             <a:fld id="{54E41A0C-13FA-495A-8B36-F957F571954B}" type="datetimeFigureOut">
               <a:rPr lang="en-US" smtClean="0"/>
-              <a:t>10/26/2025</a:t>
+              <a:t>10/28/2025</a:t>
             </a:fld>
-            <a:endParaRPr lang="en-US"/>
+            <a:endParaRPr lang="en-US" dirty="0"/>
           </a:p>
         </p:txBody>
       </p:sp>
@@ -10269,7 +10270,7 @@
           <a:bodyPr/>
           <a:lstStyle/>
           <a:p>
-            <a:endParaRPr lang="en-US"/>
+            <a:endParaRPr lang="en-US" dirty="0"/>
           </a:p>
         </p:txBody>
       </p:sp>
@@ -10298,7 +10299,7 @@
               <a:rPr lang="en-US" smtClean="0"/>
               <a:t>‹#›</a:t>
             </a:fld>
-            <a:endParaRPr lang="en-US"/>
+            <a:endParaRPr lang="en-US" dirty="0"/>
           </a:p>
         </p:txBody>
       </p:sp>
@@ -10553,9 +10554,9 @@
           <a:p>
             <a:fld id="{54E41A0C-13FA-495A-8B36-F957F571954B}" type="datetimeFigureOut">
               <a:rPr lang="en-US" smtClean="0"/>
-              <a:t>10/26/2025</a:t>
+              <a:t>10/28/2025</a:t>
             </a:fld>
-            <a:endParaRPr lang="en-US"/>
+            <a:endParaRPr lang="en-US" dirty="0"/>
           </a:p>
         </p:txBody>
       </p:sp>
@@ -10580,7 +10581,7 @@
           <a:bodyPr/>
           <a:lstStyle/>
           <a:p>
-            <a:endParaRPr lang="en-US"/>
+            <a:endParaRPr lang="en-US" dirty="0"/>
           </a:p>
         </p:txBody>
       </p:sp>
@@ -10609,7 +10610,7 @@
               <a:rPr lang="en-US" smtClean="0"/>
               <a:t>‹#›</a:t>
             </a:fld>
-            <a:endParaRPr lang="en-US"/>
+            <a:endParaRPr lang="en-US" dirty="0"/>
           </a:p>
         </p:txBody>
       </p:sp>
@@ -10743,7 +10744,7 @@
             </a:lvl9pPr>
           </a:lstStyle>
           <a:p>
-            <a:endParaRPr lang="en-US"/>
+            <a:endParaRPr lang="en-US" dirty="0"/>
           </a:p>
         </p:txBody>
       </p:sp>
@@ -10841,9 +10842,9 @@
           <a:p>
             <a:fld id="{54E41A0C-13FA-495A-8B36-F957F571954B}" type="datetimeFigureOut">
               <a:rPr lang="en-US" smtClean="0"/>
-              <a:t>10/26/2025</a:t>
+              <a:t>10/28/2025</a:t>
             </a:fld>
-            <a:endParaRPr lang="en-US"/>
+            <a:endParaRPr lang="en-US" dirty="0"/>
           </a:p>
         </p:txBody>
       </p:sp>
@@ -10868,7 +10869,7 @@
           <a:bodyPr/>
           <a:lstStyle/>
           <a:p>
-            <a:endParaRPr lang="en-US"/>
+            <a:endParaRPr lang="en-US" dirty="0"/>
           </a:p>
         </p:txBody>
       </p:sp>
@@ -10897,7 +10898,7 @@
               <a:rPr lang="en-US" smtClean="0"/>
               <a:t>‹#›</a:t>
             </a:fld>
-            <a:endParaRPr lang="en-US"/>
+            <a:endParaRPr lang="en-US" dirty="0"/>
           </a:p>
         </p:txBody>
       </p:sp>
@@ -11082,9 +11083,9 @@
           <a:p>
             <a:fld id="{54E41A0C-13FA-495A-8B36-F957F571954B}" type="datetimeFigureOut">
               <a:rPr lang="en-US" smtClean="0"/>
-              <a:t>10/26/2025</a:t>
+              <a:t>10/28/2025</a:t>
             </a:fld>
-            <a:endParaRPr lang="en-US"/>
+            <a:endParaRPr lang="en-US" dirty="0"/>
           </a:p>
         </p:txBody>
       </p:sp>
@@ -11127,7 +11128,7 @@
             </a:lvl1pPr>
           </a:lstStyle>
           <a:p>
-            <a:endParaRPr lang="en-US"/>
+            <a:endParaRPr lang="en-US" dirty="0"/>
           </a:p>
         </p:txBody>
       </p:sp>
@@ -11174,7 +11175,7 @@
               <a:rPr lang="en-US" smtClean="0"/>
               <a:t>‹#›</a:t>
             </a:fld>
-            <a:endParaRPr lang="en-US"/>
+            <a:endParaRPr lang="en-US" dirty="0"/>
           </a:p>
         </p:txBody>
       </p:sp>
@@ -12089,7 +12090,7 @@
         <p:cNvPr id="1" name="">
           <a:extLst>
             <a:ext uri="{FF2B5EF4-FFF2-40B4-BE49-F238E27FC236}">
-              <a16:creationId xmlns:a16="http://schemas.microsoft.com/office/drawing/2014/main" id="{404EBBF3-6E3C-4C00-291B-229A1AD7100E}"/>
+              <a16:creationId xmlns:a16="http://schemas.microsoft.com/office/drawing/2014/main" id="{F2BCDC42-807E-C2C6-2E48-6456F95EBD09}"/>
             </a:ext>
           </a:extLst>
         </p:cNvPr>
@@ -12109,7 +12110,7 @@
           <p:cNvPr id="6" name="Table 5">
             <a:extLst>
               <a:ext uri="{FF2B5EF4-FFF2-40B4-BE49-F238E27FC236}">
-                <a16:creationId xmlns:a16="http://schemas.microsoft.com/office/drawing/2014/main" id="{1F5B84AA-1E10-93B3-9764-506BE77B43A4}"/>
+                <a16:creationId xmlns:a16="http://schemas.microsoft.com/office/drawing/2014/main" id="{2BCAE484-BA5B-0288-A7DD-C88885B2021F}"/>
               </a:ext>
             </a:extLst>
           </p:cNvPr>
@@ -12119,7 +12120,7 @@
           <p:nvPr>
             <p:extLst>
               <p:ext uri="{D42A27DB-BD31-4B8C-83A1-F6EECF244321}">
-                <p14:modId xmlns:p14="http://schemas.microsoft.com/office/powerpoint/2010/main" val="2201268717"/>
+                <p14:modId xmlns:p14="http://schemas.microsoft.com/office/powerpoint/2010/main" val="3056755216"/>
               </p:ext>
             </p:extLst>
           </p:nvPr>
@@ -12241,10 +12242,496 @@
                     <a:p>
                       <a:pPr algn="r" rtl="1"/>
                       <a:r>
-                        <a:rPr lang="fa-IR" sz="1200" dirty="0"/>
+                        <a:rPr lang="en-US" sz="1200" dirty="0"/>
                         <a:t>10</a:t>
                       </a:r>
+                    </a:p>
+                  </a:txBody>
+                  <a:tcPr>
+                    <a:lnL w="12700" cmpd="sng">
+                      <a:noFill/>
+                    </a:lnL>
+                    <a:lnR w="12700" cmpd="sng">
+                      <a:noFill/>
+                    </a:lnR>
+                    <a:lnT w="12700" cmpd="sng">
+                      <a:noFill/>
+                    </a:lnT>
+                    <a:lnB w="38100" cmpd="sng">
+                      <a:noFill/>
+                    </a:lnB>
+                    <a:lnTlToBr w="12700" cmpd="sng">
+                      <a:noFill/>
+                      <a:prstDash val="solid"/>
+                    </a:lnTlToBr>
+                    <a:lnBlToTr w="12700" cmpd="sng">
+                      <a:noFill/>
+                      <a:prstDash val="solid"/>
+                    </a:lnBlToTr>
+                    <a:solidFill>
+                      <a:srgbClr val="2D3291"/>
+                    </a:solidFill>
+                  </a:tcPr>
+                </a:tc>
+                <a:extLst>
+                  <a:ext uri="{0D108BD9-81ED-4DB2-BD59-A6C34878D82A}">
+                    <a16:rowId xmlns:a16="http://schemas.microsoft.com/office/drawing/2014/main" val="952242590"/>
+                  </a:ext>
+                </a:extLst>
+              </a:tr>
+            </a:tbl>
+          </a:graphicData>
+        </a:graphic>
+      </p:graphicFrame>
+      <p:sp>
+        <p:nvSpPr>
+          <p:cNvPr id="5" name="Title 4">
+            <a:extLst>
+              <a:ext uri="{FF2B5EF4-FFF2-40B4-BE49-F238E27FC236}">
+                <a16:creationId xmlns:a16="http://schemas.microsoft.com/office/drawing/2014/main" id="{E3EF99E4-5676-39DB-6F1E-CF2FA26DDBA5}"/>
+              </a:ext>
+            </a:extLst>
+          </p:cNvPr>
+          <p:cNvSpPr>
+            <a:spLocks noGrp="1"/>
+          </p:cNvSpPr>
+          <p:nvPr>
+            <p:ph type="ctrTitle"/>
+          </p:nvPr>
+        </p:nvSpPr>
+        <p:spPr>
+          <a:xfrm>
+            <a:off x="275302" y="147462"/>
+            <a:ext cx="2654711" cy="739409"/>
+          </a:xfrm>
+        </p:spPr>
+        <p:txBody>
+          <a:bodyPr>
+            <a:noAutofit/>
+          </a:bodyPr>
+          <a:lstStyle/>
+          <a:p>
+            <a:pPr rtl="1"/>
+            <a:r>
+              <a:rPr lang="fa-IR" sz="4800" dirty="0">
+                <a:cs typeface="B Yekan" panose="00000400000000000000" pitchFamily="2" charset="-78"/>
+              </a:rPr>
+              <a:t>انتخاب</a:t>
+            </a:r>
+            <a:r>
+              <a:rPr lang="en-US" sz="4800" dirty="0">
+                <a:cs typeface="B Yekan" panose="00000400000000000000" pitchFamily="2" charset="-78"/>
+              </a:rPr>
+              <a:t>k </a:t>
+            </a:r>
+          </a:p>
+        </p:txBody>
+      </p:sp>
+      <p:cxnSp>
+        <p:nvCxnSpPr>
+          <p:cNvPr id="13" name="Straight Connector 12">
+            <a:extLst>
+              <a:ext uri="{FF2B5EF4-FFF2-40B4-BE49-F238E27FC236}">
+                <a16:creationId xmlns:a16="http://schemas.microsoft.com/office/drawing/2014/main" id="{8B33491F-3117-59D4-C77D-E7ABEAB78011}"/>
+              </a:ext>
+            </a:extLst>
+          </p:cNvPr>
+          <p:cNvCxnSpPr>
+            <a:cxnSpLocks/>
+          </p:cNvCxnSpPr>
+          <p:nvPr/>
+        </p:nvCxnSpPr>
+        <p:spPr>
+          <a:xfrm>
+            <a:off x="452284" y="219741"/>
+            <a:ext cx="0" cy="457200"/>
+          </a:xfrm>
+          <a:prstGeom prst="line">
+            <a:avLst/>
+          </a:prstGeom>
+          <a:ln w="57150"/>
+        </p:spPr>
+        <p:style>
+          <a:lnRef idx="1">
+            <a:schemeClr val="accent1"/>
+          </a:lnRef>
+          <a:fillRef idx="0">
+            <a:schemeClr val="accent1"/>
+          </a:fillRef>
+          <a:effectRef idx="0">
+            <a:schemeClr val="accent1"/>
+          </a:effectRef>
+          <a:fontRef idx="minor">
+            <a:schemeClr val="tx1"/>
+          </a:fontRef>
+        </p:style>
+      </p:cxnSp>
+      <p:sp>
+        <p:nvSpPr>
+          <p:cNvPr id="21" name="TextBox 20">
+            <a:extLst>
+              <a:ext uri="{FF2B5EF4-FFF2-40B4-BE49-F238E27FC236}">
+                <a16:creationId xmlns:a16="http://schemas.microsoft.com/office/drawing/2014/main" id="{6138D7A1-59C2-AC06-5FAF-CC6B350EDA2F}"/>
+              </a:ext>
+            </a:extLst>
+          </p:cNvPr>
+          <p:cNvSpPr txBox="1"/>
+          <p:nvPr/>
+        </p:nvSpPr>
+        <p:spPr>
+          <a:xfrm>
+            <a:off x="634181" y="1789075"/>
+            <a:ext cx="10923638" cy="2823850"/>
+          </a:xfrm>
+          <a:prstGeom prst="rect">
+            <a:avLst/>
+          </a:prstGeom>
+          <a:noFill/>
+        </p:spPr>
+        <p:txBody>
+          <a:bodyPr wrap="square">
+            <a:spAutoFit/>
+          </a:bodyPr>
+          <a:lstStyle/>
+          <a:p>
+            <a:pPr algn="r" rtl="1">
+              <a:lnSpc>
+                <a:spcPct val="150000"/>
+              </a:lnSpc>
+            </a:pPr>
+            <a:r>
+              <a:rPr lang="en-US" sz="2000" dirty="0">
+                <a:cs typeface="B Yekan" panose="00000400000000000000" pitchFamily="2" charset="-78"/>
+              </a:rPr>
+              <a:t>k </a:t>
+            </a:r>
+            <a:r>
+              <a:rPr lang="fa-IR" sz="2000" dirty="0">
+                <a:cs typeface="B Yekan" panose="00000400000000000000" pitchFamily="2" charset="-78"/>
+              </a:rPr>
+              <a:t>کوچک → مدل به نویز حساس می‌شود، احتمال </a:t>
+            </a:r>
+            <a:r>
+              <a:rPr lang="en-US" sz="2000" dirty="0">
+                <a:cs typeface="B Yekan" panose="00000400000000000000" pitchFamily="2" charset="-78"/>
+              </a:rPr>
+              <a:t>overfitting </a:t>
+            </a:r>
+            <a:r>
+              <a:rPr lang="fa-IR" sz="2000" dirty="0">
+                <a:cs typeface="B Yekan" panose="00000400000000000000" pitchFamily="2" charset="-78"/>
+              </a:rPr>
+              <a:t>بالا</a:t>
+            </a:r>
+          </a:p>
+          <a:p>
+            <a:pPr algn="r" rtl="1">
+              <a:lnSpc>
+                <a:spcPct val="150000"/>
+              </a:lnSpc>
+            </a:pPr>
+            <a:r>
+              <a:rPr lang="en-US" sz="2000" dirty="0">
+                <a:cs typeface="B Yekan" panose="00000400000000000000" pitchFamily="2" charset="-78"/>
+              </a:rPr>
+              <a:t>k </a:t>
+            </a:r>
+            <a:r>
+              <a:rPr lang="fa-IR" sz="2000" dirty="0">
+                <a:cs typeface="B Yekan" panose="00000400000000000000" pitchFamily="2" charset="-78"/>
+              </a:rPr>
+              <a:t>بزرگ → تصمیم‌گیری نرم‌تر اما احتمال </a:t>
+            </a:r>
+            <a:r>
+              <a:rPr lang="en-US" sz="2000" dirty="0">
+                <a:cs typeface="B Yekan" panose="00000400000000000000" pitchFamily="2" charset="-78"/>
+              </a:rPr>
+              <a:t>underfitting </a:t>
+            </a:r>
+            <a:r>
+              <a:rPr lang="fa-IR" sz="2000" dirty="0">
+                <a:cs typeface="B Yekan" panose="00000400000000000000" pitchFamily="2" charset="-78"/>
+              </a:rPr>
+              <a:t>و کاهش دقت روی جزئیات</a:t>
+            </a:r>
+          </a:p>
+          <a:p>
+            <a:pPr algn="r" rtl="1">
+              <a:lnSpc>
+                <a:spcPct val="150000"/>
+              </a:lnSpc>
+            </a:pPr>
+            <a:r>
+              <a:rPr lang="fa-IR" sz="2000" dirty="0">
+                <a:cs typeface="B Yekan" panose="00000400000000000000" pitchFamily="2" charset="-78"/>
+              </a:rPr>
+              <a:t>معمولاً انتخاب </a:t>
+            </a:r>
+            <a:r>
+              <a:rPr lang="en-US" sz="2000" dirty="0">
+                <a:cs typeface="B Yekan" panose="00000400000000000000" pitchFamily="2" charset="-78"/>
+              </a:rPr>
+              <a:t>k </a:t>
+            </a:r>
+            <a:r>
+              <a:rPr lang="fa-IR" sz="2000" dirty="0">
+                <a:cs typeface="B Yekan" panose="00000400000000000000" pitchFamily="2" charset="-78"/>
+              </a:rPr>
+              <a:t>با روش‌های </a:t>
+            </a:r>
+            <a:r>
+              <a:rPr lang="en-US" sz="2000" dirty="0">
+                <a:cs typeface="B Yekan" panose="00000400000000000000" pitchFamily="2" charset="-78"/>
+              </a:rPr>
+              <a:t>Cross-Validation </a:t>
+            </a:r>
+            <a:r>
+              <a:rPr lang="fa-IR" sz="2000" dirty="0">
+                <a:cs typeface="B Yekan" panose="00000400000000000000" pitchFamily="2" charset="-78"/>
+              </a:rPr>
+              <a:t>انجام می‌شود</a:t>
+            </a:r>
+          </a:p>
+          <a:p>
+            <a:pPr algn="r" rtl="1">
+              <a:lnSpc>
+                <a:spcPct val="150000"/>
+              </a:lnSpc>
+            </a:pPr>
+            <a:r>
+              <a:rPr lang="fa-IR" sz="2000" dirty="0">
+                <a:cs typeface="B Yekan" panose="00000400000000000000" pitchFamily="2" charset="-78"/>
+              </a:rPr>
+              <a:t>مقدار </a:t>
+            </a:r>
+            <a:r>
+              <a:rPr lang="en-US" sz="2000" dirty="0">
+                <a:cs typeface="B Yekan" panose="00000400000000000000" pitchFamily="2" charset="-78"/>
+              </a:rPr>
+              <a:t>k </a:t>
+            </a:r>
+            <a:r>
+              <a:rPr lang="fa-IR" sz="2000" dirty="0">
+                <a:cs typeface="B Yekan" panose="00000400000000000000" pitchFamily="2" charset="-78"/>
+              </a:rPr>
+              <a:t>اغلب عددی فرد (برای جلوگیری از تساوی در رأی‌گیری) انتخاب می‌شود</a:t>
+            </a:r>
+          </a:p>
+          <a:p>
+            <a:pPr algn="r" rtl="1">
+              <a:lnSpc>
+                <a:spcPct val="150000"/>
+              </a:lnSpc>
+            </a:pPr>
+            <a:r>
+              <a:rPr lang="fa-IR" sz="2000" dirty="0">
+                <a:cs typeface="B Yekan" panose="00000400000000000000" pitchFamily="2" charset="-78"/>
+              </a:rPr>
+              <a:t>انتخاب </a:t>
+            </a:r>
+            <a:r>
+              <a:rPr lang="en-US" sz="2000" dirty="0">
+                <a:cs typeface="B Yekan" panose="00000400000000000000" pitchFamily="2" charset="-78"/>
+              </a:rPr>
+              <a:t>k </a:t>
+            </a:r>
+            <a:r>
+              <a:rPr lang="fa-IR" sz="2000" dirty="0">
+                <a:cs typeface="B Yekan" panose="00000400000000000000" pitchFamily="2" charset="-78"/>
+              </a:rPr>
+              <a:t>وابسته به تراکم و اندازه ی داده است؛ با افزایش داده ی آموزشی، معمولاً </a:t>
+            </a:r>
+            <a:r>
+              <a:rPr lang="en-US" sz="2000" dirty="0">
+                <a:cs typeface="B Yekan" panose="00000400000000000000" pitchFamily="2" charset="-78"/>
+              </a:rPr>
+              <a:t>k </a:t>
+            </a:r>
+            <a:r>
+              <a:rPr lang="fa-IR" sz="2000" dirty="0">
+                <a:cs typeface="B Yekan" panose="00000400000000000000" pitchFamily="2" charset="-78"/>
+              </a:rPr>
+              <a:t>هم کمی بزرگ‌تر انتخاب می‌شود</a:t>
+            </a:r>
+          </a:p>
+        </p:txBody>
+      </p:sp>
+    </p:spTree>
+    <p:extLst>
+      <p:ext uri="{BB962C8B-B14F-4D97-AF65-F5344CB8AC3E}">
+        <p14:creationId xmlns:p14="http://schemas.microsoft.com/office/powerpoint/2010/main" val="504658541"/>
+      </p:ext>
+    </p:extLst>
+  </p:cSld>
+  <p:clrMapOvr>
+    <a:masterClrMapping/>
+  </p:clrMapOvr>
+</p:sld>
+</file>
+
+<file path=ppt/slides/slide11.xml><?xml version="1.0" encoding="utf-8"?>
+<p:sld xmlns:a="http://schemas.openxmlformats.org/drawingml/2006/main" xmlns:r="http://schemas.openxmlformats.org/officeDocument/2006/relationships" xmlns:p="http://schemas.openxmlformats.org/presentationml/2006/main">
+  <p:cSld>
+    <p:spTree>
+      <p:nvGrpSpPr>
+        <p:cNvPr id="1" name="">
+          <a:extLst>
+            <a:ext uri="{FF2B5EF4-FFF2-40B4-BE49-F238E27FC236}">
+              <a16:creationId xmlns:a16="http://schemas.microsoft.com/office/drawing/2014/main" id="{404EBBF3-6E3C-4C00-291B-229A1AD7100E}"/>
+            </a:ext>
+          </a:extLst>
+        </p:cNvPr>
+        <p:cNvGrpSpPr/>
+        <p:nvPr/>
+      </p:nvGrpSpPr>
+      <p:grpSpPr>
+        <a:xfrm>
+          <a:off x="0" y="0"/>
+          <a:ext cx="0" cy="0"/>
+          <a:chOff x="0" y="0"/>
+          <a:chExt cx="0" cy="0"/>
+        </a:xfrm>
+      </p:grpSpPr>
+      <p:graphicFrame>
+        <p:nvGraphicFramePr>
+          <p:cNvPr id="6" name="Table 5">
+            <a:extLst>
+              <a:ext uri="{FF2B5EF4-FFF2-40B4-BE49-F238E27FC236}">
+                <a16:creationId xmlns:a16="http://schemas.microsoft.com/office/drawing/2014/main" id="{1F5B84AA-1E10-93B3-9764-506BE77B43A4}"/>
+              </a:ext>
+            </a:extLst>
+          </p:cNvPr>
+          <p:cNvGraphicFramePr>
+            <a:graphicFrameLocks noGrp="1"/>
+          </p:cNvGraphicFramePr>
+          <p:nvPr>
+            <p:extLst>
+              <p:ext uri="{D42A27DB-BD31-4B8C-83A1-F6EECF244321}">
+                <p14:modId xmlns:p14="http://schemas.microsoft.com/office/powerpoint/2010/main" val="3957600331"/>
+              </p:ext>
+            </p:extLst>
+          </p:nvPr>
+        </p:nvGraphicFramePr>
+        <p:xfrm>
+          <a:off x="0" y="6593512"/>
+          <a:ext cx="12192000" cy="274320"/>
+        </p:xfrm>
+        <a:graphic>
+          <a:graphicData uri="http://schemas.openxmlformats.org/drawingml/2006/table">
+            <a:tbl>
+              <a:tblPr firstRow="1" bandRow="1">
+                <a:tableStyleId>{5C22544A-7EE6-4342-B048-85BDC9FD1C3A}</a:tableStyleId>
+              </a:tblPr>
+              <a:tblGrid>
+                <a:gridCol w="4064000">
+                  <a:extLst>
+                    <a:ext uri="{9D8B030D-6E8A-4147-A177-3AD203B41FA5}">
+                      <a16:colId xmlns:a16="http://schemas.microsoft.com/office/drawing/2014/main" val="2488570630"/>
+                    </a:ext>
+                  </a:extLst>
+                </a:gridCol>
+                <a:gridCol w="4064000">
+                  <a:extLst>
+                    <a:ext uri="{9D8B030D-6E8A-4147-A177-3AD203B41FA5}">
+                      <a16:colId xmlns:a16="http://schemas.microsoft.com/office/drawing/2014/main" val="2624477640"/>
+                    </a:ext>
+                  </a:extLst>
+                </a:gridCol>
+                <a:gridCol w="4064000">
+                  <a:extLst>
+                    <a:ext uri="{9D8B030D-6E8A-4147-A177-3AD203B41FA5}">
+                      <a16:colId xmlns:a16="http://schemas.microsoft.com/office/drawing/2014/main" val="2474943440"/>
+                    </a:ext>
+                  </a:extLst>
+                </a:gridCol>
+              </a:tblGrid>
+              <a:tr h="117986">
+                <a:tc>
+                  <a:txBody>
+                    <a:bodyPr/>
+                    <a:lstStyle/>
+                    <a:p>
                       <a:endParaRPr lang="en-US" sz="1200" dirty="0"/>
+                    </a:p>
+                  </a:txBody>
+                  <a:tcPr>
+                    <a:lnL w="12700" cmpd="sng">
+                      <a:noFill/>
+                    </a:lnL>
+                    <a:lnR w="12700" cmpd="sng">
+                      <a:noFill/>
+                    </a:lnR>
+                    <a:lnT w="12700" cmpd="sng">
+                      <a:noFill/>
+                    </a:lnT>
+                    <a:lnB w="38100" cmpd="sng">
+                      <a:noFill/>
+                    </a:lnB>
+                    <a:lnTlToBr w="12700" cmpd="sng">
+                      <a:noFill/>
+                      <a:prstDash val="solid"/>
+                    </a:lnTlToBr>
+                    <a:lnBlToTr w="12700" cmpd="sng">
+                      <a:noFill/>
+                      <a:prstDash val="solid"/>
+                    </a:lnBlToTr>
+                    <a:solidFill>
+                      <a:srgbClr val="2D3291"/>
+                    </a:solidFill>
+                  </a:tcPr>
+                </a:tc>
+                <a:tc>
+                  <a:txBody>
+                    <a:bodyPr/>
+                    <a:lstStyle/>
+                    <a:p>
+                      <a:pPr algn="ctr"/>
+                      <a:r>
+                        <a:rPr lang="en-US" sz="1200" dirty="0">
+                          <a:solidFill>
+                            <a:srgbClr val="2D3291"/>
+                          </a:solidFill>
+                        </a:rPr>
+                        <a:t>Machine Learning</a:t>
+                      </a:r>
+                    </a:p>
+                  </a:txBody>
+                  <a:tcPr>
+                    <a:lnL w="12700" cmpd="sng">
+                      <a:noFill/>
+                    </a:lnL>
+                    <a:lnR w="12700" cmpd="sng">
+                      <a:noFill/>
+                    </a:lnR>
+                    <a:lnT w="12700" cmpd="sng">
+                      <a:noFill/>
+                    </a:lnT>
+                    <a:lnB w="38100" cmpd="sng">
+                      <a:noFill/>
+                    </a:lnB>
+                    <a:lnTlToBr w="12700" cmpd="sng">
+                      <a:noFill/>
+                      <a:prstDash val="solid"/>
+                    </a:lnTlToBr>
+                    <a:lnBlToTr w="12700" cmpd="sng">
+                      <a:noFill/>
+                      <a:prstDash val="solid"/>
+                    </a:lnBlToTr>
+                    <a:solidFill>
+                      <a:srgbClr val="E4E4E4"/>
+                    </a:solidFill>
+                  </a:tcPr>
+                </a:tc>
+                <a:tc>
+                  <a:txBody>
+                    <a:bodyPr/>
+                    <a:lstStyle/>
+                    <a:p>
+                      <a:pPr algn="r" rtl="1"/>
+                      <a:r>
+                        <a:rPr lang="en-US" sz="1200" dirty="0"/>
+                        <a:t>11</a:t>
+                      </a:r>
                     </a:p>
                   </a:txBody>
                   <a:tcPr>
@@ -12584,7 +13071,7 @@
 </p:sld>
 </file>
 
-<file path=ppt/slides/slide11.xml><?xml version="1.0" encoding="utf-8"?>
+<file path=ppt/slides/slide12.xml><?xml version="1.0" encoding="utf-8"?>
 <p:sld xmlns:a="http://schemas.openxmlformats.org/drawingml/2006/main" xmlns:r="http://schemas.openxmlformats.org/officeDocument/2006/relationships" xmlns:p="http://schemas.openxmlformats.org/presentationml/2006/main">
   <p:cSld>
     <p:spTree>
@@ -12622,7 +13109,7 @@
           <p:nvPr>
             <p:extLst>
               <p:ext uri="{D42A27DB-BD31-4B8C-83A1-F6EECF244321}">
-                <p14:modId xmlns:p14="http://schemas.microsoft.com/office/powerpoint/2010/main" val="3792446083"/>
+                <p14:modId xmlns:p14="http://schemas.microsoft.com/office/powerpoint/2010/main" val="1298654671"/>
               </p:ext>
             </p:extLst>
           </p:nvPr>
@@ -12744,10 +13231,9 @@
                     <a:p>
                       <a:pPr algn="r" rtl="1"/>
                       <a:r>
-                        <a:rPr lang="fa-IR" sz="1200" dirty="0"/>
-                        <a:t>11</a:t>
+                        <a:rPr lang="en-US" sz="1200" dirty="0"/>
+                        <a:t>12</a:t>
                       </a:r>
-                      <a:endParaRPr lang="en-US" sz="1200" dirty="0"/>
                     </a:p>
                   </a:txBody>
                   <a:tcPr>
@@ -14162,7 +14648,7 @@
 </p:sld>
 </file>
 
-<file path=ppt/slides/slide12.xml><?xml version="1.0" encoding="utf-8"?>
+<file path=ppt/slides/slide13.xml><?xml version="1.0" encoding="utf-8"?>
 <p:sld xmlns:a="http://schemas.openxmlformats.org/drawingml/2006/main" xmlns:r="http://schemas.openxmlformats.org/officeDocument/2006/relationships" xmlns:p="http://schemas.openxmlformats.org/presentationml/2006/main">
   <p:cSld>
     <p:spTree>
@@ -14237,7 +14723,7 @@
           <a:lstStyle/>
           <a:p>
             <a:pPr algn="ctr"/>
-            <a:endParaRPr lang="en-US"/>
+            <a:endParaRPr lang="en-US" dirty="0"/>
           </a:p>
         </p:txBody>
       </p:sp>
@@ -14293,7 +14779,7 @@
           <a:lstStyle/>
           <a:p>
             <a:pPr algn="ctr"/>
-            <a:endParaRPr lang="en-US"/>
+            <a:endParaRPr lang="en-US" dirty="0"/>
           </a:p>
         </p:txBody>
       </p:sp>
@@ -14312,7 +14798,7 @@
           <p:nvPr>
             <p:extLst>
               <p:ext uri="{D42A27DB-BD31-4B8C-83A1-F6EECF244321}">
-                <p14:modId xmlns:p14="http://schemas.microsoft.com/office/powerpoint/2010/main" val="4260584181"/>
+                <p14:modId xmlns:p14="http://schemas.microsoft.com/office/powerpoint/2010/main" val="3483243242"/>
               </p:ext>
             </p:extLst>
           </p:nvPr>
@@ -14434,10 +14920,9 @@
                     <a:p>
                       <a:pPr algn="r" rtl="1"/>
                       <a:r>
-                        <a:rPr lang="fa-IR" sz="1200" dirty="0"/>
-                        <a:t>12</a:t>
+                        <a:rPr lang="en-US" sz="1200" dirty="0"/>
+                        <a:t>13</a:t>
                       </a:r>
-                      <a:endParaRPr lang="en-US" sz="1200" dirty="0"/>
                     </a:p>
                   </a:txBody>
                   <a:tcPr>
@@ -17833,7 +18318,7 @@
         <p:cNvPr id="1" name="">
           <a:extLst>
             <a:ext uri="{FF2B5EF4-FFF2-40B4-BE49-F238E27FC236}">
-              <a16:creationId xmlns:a16="http://schemas.microsoft.com/office/drawing/2014/main" id="{F2BCDC42-807E-C2C6-2E48-6456F95EBD09}"/>
+              <a16:creationId xmlns:a16="http://schemas.microsoft.com/office/drawing/2014/main" id="{55F1D3A3-948A-4E67-D1C5-467EA4261A45}"/>
             </a:ext>
           </a:extLst>
         </p:cNvPr>
@@ -17850,10 +18335,10 @@
       </p:grpSpPr>
       <p:graphicFrame>
         <p:nvGraphicFramePr>
-          <p:cNvPr id="6" name="Table 5">
+          <p:cNvPr id="8" name="Table 7">
             <a:extLst>
               <a:ext uri="{FF2B5EF4-FFF2-40B4-BE49-F238E27FC236}">
-                <a16:creationId xmlns:a16="http://schemas.microsoft.com/office/drawing/2014/main" id="{2BCAE484-BA5B-0288-A7DD-C88885B2021F}"/>
+                <a16:creationId xmlns:a16="http://schemas.microsoft.com/office/drawing/2014/main" id="{4B084CA3-A718-8D68-93BF-D23E4B2E05A7}"/>
               </a:ext>
             </a:extLst>
           </p:cNvPr>
@@ -17863,7 +18348,2346 @@
           <p:nvPr>
             <p:extLst>
               <p:ext uri="{D42A27DB-BD31-4B8C-83A1-F6EECF244321}">
-                <p14:modId xmlns:p14="http://schemas.microsoft.com/office/powerpoint/2010/main" val="931806832"/>
+                <p14:modId xmlns:p14="http://schemas.microsoft.com/office/powerpoint/2010/main" val="2790189098"/>
+              </p:ext>
+            </p:extLst>
+          </p:nvPr>
+        </p:nvGraphicFramePr>
+        <p:xfrm>
+          <a:off x="452285" y="1467464"/>
+          <a:ext cx="3588780" cy="3923066"/>
+        </p:xfrm>
+        <a:graphic>
+          <a:graphicData uri="http://schemas.openxmlformats.org/drawingml/2006/table">
+            <a:tbl>
+              <a:tblPr firstRow="1" bandRow="1">
+                <a:tableStyleId>{5C22544A-7EE6-4342-B048-85BDC9FD1C3A}</a:tableStyleId>
+              </a:tblPr>
+              <a:tblGrid>
+                <a:gridCol w="239252">
+                  <a:extLst>
+                    <a:ext uri="{9D8B030D-6E8A-4147-A177-3AD203B41FA5}">
+                      <a16:colId xmlns:a16="http://schemas.microsoft.com/office/drawing/2014/main" val="3220349596"/>
+                    </a:ext>
+                  </a:extLst>
+                </a:gridCol>
+                <a:gridCol w="239252">
+                  <a:extLst>
+                    <a:ext uri="{9D8B030D-6E8A-4147-A177-3AD203B41FA5}">
+                      <a16:colId xmlns:a16="http://schemas.microsoft.com/office/drawing/2014/main" val="3332109672"/>
+                    </a:ext>
+                  </a:extLst>
+                </a:gridCol>
+                <a:gridCol w="239252">
+                  <a:extLst>
+                    <a:ext uri="{9D8B030D-6E8A-4147-A177-3AD203B41FA5}">
+                      <a16:colId xmlns:a16="http://schemas.microsoft.com/office/drawing/2014/main" val="3639975805"/>
+                    </a:ext>
+                  </a:extLst>
+                </a:gridCol>
+                <a:gridCol w="239252">
+                  <a:extLst>
+                    <a:ext uri="{9D8B030D-6E8A-4147-A177-3AD203B41FA5}">
+                      <a16:colId xmlns:a16="http://schemas.microsoft.com/office/drawing/2014/main" val="3003907121"/>
+                    </a:ext>
+                  </a:extLst>
+                </a:gridCol>
+                <a:gridCol w="239252">
+                  <a:extLst>
+                    <a:ext uri="{9D8B030D-6E8A-4147-A177-3AD203B41FA5}">
+                      <a16:colId xmlns:a16="http://schemas.microsoft.com/office/drawing/2014/main" val="3206494375"/>
+                    </a:ext>
+                  </a:extLst>
+                </a:gridCol>
+                <a:gridCol w="239252">
+                  <a:extLst>
+                    <a:ext uri="{9D8B030D-6E8A-4147-A177-3AD203B41FA5}">
+                      <a16:colId xmlns:a16="http://schemas.microsoft.com/office/drawing/2014/main" val="3423184086"/>
+                    </a:ext>
+                  </a:extLst>
+                </a:gridCol>
+                <a:gridCol w="239252">
+                  <a:extLst>
+                    <a:ext uri="{9D8B030D-6E8A-4147-A177-3AD203B41FA5}">
+                      <a16:colId xmlns:a16="http://schemas.microsoft.com/office/drawing/2014/main" val="1892500336"/>
+                    </a:ext>
+                  </a:extLst>
+                </a:gridCol>
+                <a:gridCol w="239252">
+                  <a:extLst>
+                    <a:ext uri="{9D8B030D-6E8A-4147-A177-3AD203B41FA5}">
+                      <a16:colId xmlns:a16="http://schemas.microsoft.com/office/drawing/2014/main" val="168578386"/>
+                    </a:ext>
+                  </a:extLst>
+                </a:gridCol>
+                <a:gridCol w="239252">
+                  <a:extLst>
+                    <a:ext uri="{9D8B030D-6E8A-4147-A177-3AD203B41FA5}">
+                      <a16:colId xmlns:a16="http://schemas.microsoft.com/office/drawing/2014/main" val="2228220163"/>
+                    </a:ext>
+                  </a:extLst>
+                </a:gridCol>
+                <a:gridCol w="239252">
+                  <a:extLst>
+                    <a:ext uri="{9D8B030D-6E8A-4147-A177-3AD203B41FA5}">
+                      <a16:colId xmlns:a16="http://schemas.microsoft.com/office/drawing/2014/main" val="1542342905"/>
+                    </a:ext>
+                  </a:extLst>
+                </a:gridCol>
+                <a:gridCol w="239252">
+                  <a:extLst>
+                    <a:ext uri="{9D8B030D-6E8A-4147-A177-3AD203B41FA5}">
+                      <a16:colId xmlns:a16="http://schemas.microsoft.com/office/drawing/2014/main" val="2190074618"/>
+                    </a:ext>
+                  </a:extLst>
+                </a:gridCol>
+                <a:gridCol w="239252">
+                  <a:extLst>
+                    <a:ext uri="{9D8B030D-6E8A-4147-A177-3AD203B41FA5}">
+                      <a16:colId xmlns:a16="http://schemas.microsoft.com/office/drawing/2014/main" val="3455808205"/>
+                    </a:ext>
+                  </a:extLst>
+                </a:gridCol>
+                <a:gridCol w="239252">
+                  <a:extLst>
+                    <a:ext uri="{9D8B030D-6E8A-4147-A177-3AD203B41FA5}">
+                      <a16:colId xmlns:a16="http://schemas.microsoft.com/office/drawing/2014/main" val="3617778729"/>
+                    </a:ext>
+                  </a:extLst>
+                </a:gridCol>
+                <a:gridCol w="239252">
+                  <a:extLst>
+                    <a:ext uri="{9D8B030D-6E8A-4147-A177-3AD203B41FA5}">
+                      <a16:colId xmlns:a16="http://schemas.microsoft.com/office/drawing/2014/main" val="1955337914"/>
+                    </a:ext>
+                  </a:extLst>
+                </a:gridCol>
+                <a:gridCol w="239252">
+                  <a:extLst>
+                    <a:ext uri="{9D8B030D-6E8A-4147-A177-3AD203B41FA5}">
+                      <a16:colId xmlns:a16="http://schemas.microsoft.com/office/drawing/2014/main" val="1439261544"/>
+                    </a:ext>
+                  </a:extLst>
+                </a:gridCol>
+              </a:tblGrid>
+              <a:tr h="280219">
+                <a:tc>
+                  <a:txBody>
+                    <a:bodyPr/>
+                    <a:lstStyle/>
+                    <a:p>
+                      <a:endParaRPr lang="en-US" sz="1000" dirty="0"/>
+                    </a:p>
+                  </a:txBody>
+                  <a:tcPr/>
+                </a:tc>
+                <a:tc>
+                  <a:txBody>
+                    <a:bodyPr/>
+                    <a:lstStyle/>
+                    <a:p>
+                      <a:endParaRPr lang="en-US" sz="1000" dirty="0"/>
+                    </a:p>
+                  </a:txBody>
+                  <a:tcPr/>
+                </a:tc>
+                <a:tc>
+                  <a:txBody>
+                    <a:bodyPr/>
+                    <a:lstStyle/>
+                    <a:p>
+                      <a:endParaRPr lang="en-US" sz="1000" dirty="0"/>
+                    </a:p>
+                  </a:txBody>
+                  <a:tcPr/>
+                </a:tc>
+                <a:tc>
+                  <a:txBody>
+                    <a:bodyPr/>
+                    <a:lstStyle/>
+                    <a:p>
+                      <a:endParaRPr lang="en-US" sz="1000" dirty="0"/>
+                    </a:p>
+                  </a:txBody>
+                  <a:tcPr/>
+                </a:tc>
+                <a:tc>
+                  <a:txBody>
+                    <a:bodyPr/>
+                    <a:lstStyle/>
+                    <a:p>
+                      <a:endParaRPr lang="en-US" sz="1000" dirty="0"/>
+                    </a:p>
+                  </a:txBody>
+                  <a:tcPr/>
+                </a:tc>
+                <a:tc>
+                  <a:txBody>
+                    <a:bodyPr/>
+                    <a:lstStyle/>
+                    <a:p>
+                      <a:endParaRPr lang="en-US" sz="1000" dirty="0"/>
+                    </a:p>
+                  </a:txBody>
+                  <a:tcPr/>
+                </a:tc>
+                <a:tc>
+                  <a:txBody>
+                    <a:bodyPr/>
+                    <a:lstStyle/>
+                    <a:p>
+                      <a:endParaRPr lang="en-US" sz="1000" dirty="0"/>
+                    </a:p>
+                  </a:txBody>
+                  <a:tcPr/>
+                </a:tc>
+                <a:tc>
+                  <a:txBody>
+                    <a:bodyPr/>
+                    <a:lstStyle/>
+                    <a:p>
+                      <a:endParaRPr lang="en-US" sz="1000" dirty="0"/>
+                    </a:p>
+                  </a:txBody>
+                  <a:tcPr/>
+                </a:tc>
+                <a:tc>
+                  <a:txBody>
+                    <a:bodyPr/>
+                    <a:lstStyle/>
+                    <a:p>
+                      <a:endParaRPr lang="en-US" sz="1000" dirty="0"/>
+                    </a:p>
+                  </a:txBody>
+                  <a:tcPr/>
+                </a:tc>
+                <a:tc>
+                  <a:txBody>
+                    <a:bodyPr/>
+                    <a:lstStyle/>
+                    <a:p>
+                      <a:endParaRPr lang="en-US" sz="1000" dirty="0"/>
+                    </a:p>
+                  </a:txBody>
+                  <a:tcPr/>
+                </a:tc>
+                <a:tc>
+                  <a:txBody>
+                    <a:bodyPr/>
+                    <a:lstStyle/>
+                    <a:p>
+                      <a:endParaRPr lang="en-US" sz="1000" dirty="0"/>
+                    </a:p>
+                  </a:txBody>
+                  <a:tcPr/>
+                </a:tc>
+                <a:tc>
+                  <a:txBody>
+                    <a:bodyPr/>
+                    <a:lstStyle/>
+                    <a:p>
+                      <a:endParaRPr lang="en-US" sz="1000" dirty="0"/>
+                    </a:p>
+                  </a:txBody>
+                  <a:tcPr/>
+                </a:tc>
+                <a:tc>
+                  <a:txBody>
+                    <a:bodyPr/>
+                    <a:lstStyle/>
+                    <a:p>
+                      <a:endParaRPr lang="en-US" sz="1000" dirty="0"/>
+                    </a:p>
+                  </a:txBody>
+                  <a:tcPr/>
+                </a:tc>
+                <a:tc>
+                  <a:txBody>
+                    <a:bodyPr/>
+                    <a:lstStyle/>
+                    <a:p>
+                      <a:endParaRPr lang="en-US" sz="1000" dirty="0"/>
+                    </a:p>
+                  </a:txBody>
+                  <a:tcPr/>
+                </a:tc>
+                <a:tc>
+                  <a:txBody>
+                    <a:bodyPr/>
+                    <a:lstStyle/>
+                    <a:p>
+                      <a:endParaRPr lang="en-US" sz="1000" dirty="0"/>
+                    </a:p>
+                  </a:txBody>
+                  <a:tcPr/>
+                </a:tc>
+                <a:extLst>
+                  <a:ext uri="{0D108BD9-81ED-4DB2-BD59-A6C34878D82A}">
+                    <a16:rowId xmlns:a16="http://schemas.microsoft.com/office/drawing/2014/main" val="2000308218"/>
+                  </a:ext>
+                </a:extLst>
+              </a:tr>
+              <a:tr h="280219">
+                <a:tc>
+                  <a:txBody>
+                    <a:bodyPr/>
+                    <a:lstStyle/>
+                    <a:p>
+                      <a:endParaRPr lang="en-US" sz="1000" dirty="0"/>
+                    </a:p>
+                  </a:txBody>
+                  <a:tcPr/>
+                </a:tc>
+                <a:tc>
+                  <a:txBody>
+                    <a:bodyPr/>
+                    <a:lstStyle/>
+                    <a:p>
+                      <a:endParaRPr lang="en-US" sz="1000" dirty="0"/>
+                    </a:p>
+                  </a:txBody>
+                  <a:tcPr/>
+                </a:tc>
+                <a:tc>
+                  <a:txBody>
+                    <a:bodyPr/>
+                    <a:lstStyle/>
+                    <a:p>
+                      <a:endParaRPr lang="en-US" sz="1000" dirty="0"/>
+                    </a:p>
+                  </a:txBody>
+                  <a:tcPr/>
+                </a:tc>
+                <a:tc>
+                  <a:txBody>
+                    <a:bodyPr/>
+                    <a:lstStyle/>
+                    <a:p>
+                      <a:endParaRPr lang="en-US" sz="1000" dirty="0"/>
+                    </a:p>
+                  </a:txBody>
+                  <a:tcPr/>
+                </a:tc>
+                <a:tc>
+                  <a:txBody>
+                    <a:bodyPr/>
+                    <a:lstStyle/>
+                    <a:p>
+                      <a:endParaRPr lang="en-US" sz="1000" dirty="0"/>
+                    </a:p>
+                  </a:txBody>
+                  <a:tcPr/>
+                </a:tc>
+                <a:tc>
+                  <a:txBody>
+                    <a:bodyPr/>
+                    <a:lstStyle/>
+                    <a:p>
+                      <a:endParaRPr lang="en-US" sz="1000" dirty="0"/>
+                    </a:p>
+                  </a:txBody>
+                  <a:tcPr/>
+                </a:tc>
+                <a:tc>
+                  <a:txBody>
+                    <a:bodyPr/>
+                    <a:lstStyle/>
+                    <a:p>
+                      <a:endParaRPr lang="en-US" sz="1000" dirty="0"/>
+                    </a:p>
+                  </a:txBody>
+                  <a:tcPr/>
+                </a:tc>
+                <a:tc>
+                  <a:txBody>
+                    <a:bodyPr/>
+                    <a:lstStyle/>
+                    <a:p>
+                      <a:endParaRPr lang="en-US" sz="1000" dirty="0"/>
+                    </a:p>
+                  </a:txBody>
+                  <a:tcPr/>
+                </a:tc>
+                <a:tc>
+                  <a:txBody>
+                    <a:bodyPr/>
+                    <a:lstStyle/>
+                    <a:p>
+                      <a:endParaRPr lang="en-US" sz="1000" dirty="0"/>
+                    </a:p>
+                  </a:txBody>
+                  <a:tcPr/>
+                </a:tc>
+                <a:tc>
+                  <a:txBody>
+                    <a:bodyPr/>
+                    <a:lstStyle/>
+                    <a:p>
+                      <a:endParaRPr lang="en-US" sz="1000" dirty="0"/>
+                    </a:p>
+                  </a:txBody>
+                  <a:tcPr/>
+                </a:tc>
+                <a:tc>
+                  <a:txBody>
+                    <a:bodyPr/>
+                    <a:lstStyle/>
+                    <a:p>
+                      <a:endParaRPr lang="en-US" sz="1000" dirty="0"/>
+                    </a:p>
+                  </a:txBody>
+                  <a:tcPr/>
+                </a:tc>
+                <a:tc>
+                  <a:txBody>
+                    <a:bodyPr/>
+                    <a:lstStyle/>
+                    <a:p>
+                      <a:endParaRPr lang="en-US" sz="1000" dirty="0"/>
+                    </a:p>
+                  </a:txBody>
+                  <a:tcPr/>
+                </a:tc>
+                <a:tc>
+                  <a:txBody>
+                    <a:bodyPr/>
+                    <a:lstStyle/>
+                    <a:p>
+                      <a:endParaRPr lang="en-US" sz="1000" dirty="0"/>
+                    </a:p>
+                  </a:txBody>
+                  <a:tcPr/>
+                </a:tc>
+                <a:tc>
+                  <a:txBody>
+                    <a:bodyPr/>
+                    <a:lstStyle/>
+                    <a:p>
+                      <a:endParaRPr lang="en-US" sz="1000" dirty="0"/>
+                    </a:p>
+                  </a:txBody>
+                  <a:tcPr/>
+                </a:tc>
+                <a:tc>
+                  <a:txBody>
+                    <a:bodyPr/>
+                    <a:lstStyle/>
+                    <a:p>
+                      <a:endParaRPr lang="en-US" sz="1000" dirty="0"/>
+                    </a:p>
+                  </a:txBody>
+                  <a:tcPr/>
+                </a:tc>
+                <a:extLst>
+                  <a:ext uri="{0D108BD9-81ED-4DB2-BD59-A6C34878D82A}">
+                    <a16:rowId xmlns:a16="http://schemas.microsoft.com/office/drawing/2014/main" val="1303943737"/>
+                  </a:ext>
+                </a:extLst>
+              </a:tr>
+              <a:tr h="280219">
+                <a:tc>
+                  <a:txBody>
+                    <a:bodyPr/>
+                    <a:lstStyle/>
+                    <a:p>
+                      <a:endParaRPr lang="en-US" sz="1000" dirty="0"/>
+                    </a:p>
+                  </a:txBody>
+                  <a:tcPr/>
+                </a:tc>
+                <a:tc>
+                  <a:txBody>
+                    <a:bodyPr/>
+                    <a:lstStyle/>
+                    <a:p>
+                      <a:endParaRPr lang="en-US" sz="1000" dirty="0"/>
+                    </a:p>
+                  </a:txBody>
+                  <a:tcPr/>
+                </a:tc>
+                <a:tc>
+                  <a:txBody>
+                    <a:bodyPr/>
+                    <a:lstStyle/>
+                    <a:p>
+                      <a:endParaRPr lang="en-US" sz="1000" dirty="0"/>
+                    </a:p>
+                  </a:txBody>
+                  <a:tcPr/>
+                </a:tc>
+                <a:tc>
+                  <a:txBody>
+                    <a:bodyPr/>
+                    <a:lstStyle/>
+                    <a:p>
+                      <a:endParaRPr lang="en-US" sz="1000" dirty="0"/>
+                    </a:p>
+                  </a:txBody>
+                  <a:tcPr/>
+                </a:tc>
+                <a:tc>
+                  <a:txBody>
+                    <a:bodyPr/>
+                    <a:lstStyle/>
+                    <a:p>
+                      <a:endParaRPr lang="en-US" sz="1000" dirty="0"/>
+                    </a:p>
+                  </a:txBody>
+                  <a:tcPr/>
+                </a:tc>
+                <a:tc>
+                  <a:txBody>
+                    <a:bodyPr/>
+                    <a:lstStyle/>
+                    <a:p>
+                      <a:endParaRPr lang="en-US" sz="1000" dirty="0"/>
+                    </a:p>
+                  </a:txBody>
+                  <a:tcPr/>
+                </a:tc>
+                <a:tc>
+                  <a:txBody>
+                    <a:bodyPr/>
+                    <a:lstStyle/>
+                    <a:p>
+                      <a:endParaRPr lang="en-US" sz="1000" dirty="0"/>
+                    </a:p>
+                  </a:txBody>
+                  <a:tcPr/>
+                </a:tc>
+                <a:tc>
+                  <a:txBody>
+                    <a:bodyPr/>
+                    <a:lstStyle/>
+                    <a:p>
+                      <a:endParaRPr lang="en-US" sz="1000" dirty="0"/>
+                    </a:p>
+                  </a:txBody>
+                  <a:tcPr/>
+                </a:tc>
+                <a:tc>
+                  <a:txBody>
+                    <a:bodyPr/>
+                    <a:lstStyle/>
+                    <a:p>
+                      <a:endParaRPr lang="en-US" sz="1000" dirty="0"/>
+                    </a:p>
+                  </a:txBody>
+                  <a:tcPr/>
+                </a:tc>
+                <a:tc>
+                  <a:txBody>
+                    <a:bodyPr/>
+                    <a:lstStyle/>
+                    <a:p>
+                      <a:endParaRPr lang="en-US" sz="1000" dirty="0"/>
+                    </a:p>
+                  </a:txBody>
+                  <a:tcPr/>
+                </a:tc>
+                <a:tc>
+                  <a:txBody>
+                    <a:bodyPr/>
+                    <a:lstStyle/>
+                    <a:p>
+                      <a:endParaRPr lang="en-US" sz="1000" dirty="0"/>
+                    </a:p>
+                  </a:txBody>
+                  <a:tcPr/>
+                </a:tc>
+                <a:tc>
+                  <a:txBody>
+                    <a:bodyPr/>
+                    <a:lstStyle/>
+                    <a:p>
+                      <a:endParaRPr lang="en-US" sz="1000" dirty="0"/>
+                    </a:p>
+                  </a:txBody>
+                  <a:tcPr/>
+                </a:tc>
+                <a:tc>
+                  <a:txBody>
+                    <a:bodyPr/>
+                    <a:lstStyle/>
+                    <a:p>
+                      <a:endParaRPr lang="en-US" sz="1000" dirty="0"/>
+                    </a:p>
+                  </a:txBody>
+                  <a:tcPr/>
+                </a:tc>
+                <a:tc>
+                  <a:txBody>
+                    <a:bodyPr/>
+                    <a:lstStyle/>
+                    <a:p>
+                      <a:endParaRPr lang="en-US" sz="1000" dirty="0"/>
+                    </a:p>
+                  </a:txBody>
+                  <a:tcPr/>
+                </a:tc>
+                <a:tc>
+                  <a:txBody>
+                    <a:bodyPr/>
+                    <a:lstStyle/>
+                    <a:p>
+                      <a:endParaRPr lang="en-US" sz="1000" dirty="0"/>
+                    </a:p>
+                  </a:txBody>
+                  <a:tcPr/>
+                </a:tc>
+                <a:extLst>
+                  <a:ext uri="{0D108BD9-81ED-4DB2-BD59-A6C34878D82A}">
+                    <a16:rowId xmlns:a16="http://schemas.microsoft.com/office/drawing/2014/main" val="4129752528"/>
+                  </a:ext>
+                </a:extLst>
+              </a:tr>
+              <a:tr h="280219">
+                <a:tc>
+                  <a:txBody>
+                    <a:bodyPr/>
+                    <a:lstStyle/>
+                    <a:p>
+                      <a:endParaRPr lang="en-US" sz="1000" dirty="0"/>
+                    </a:p>
+                  </a:txBody>
+                  <a:tcPr/>
+                </a:tc>
+                <a:tc>
+                  <a:txBody>
+                    <a:bodyPr/>
+                    <a:lstStyle/>
+                    <a:p>
+                      <a:endParaRPr lang="en-US" sz="1000" dirty="0"/>
+                    </a:p>
+                  </a:txBody>
+                  <a:tcPr/>
+                </a:tc>
+                <a:tc>
+                  <a:txBody>
+                    <a:bodyPr/>
+                    <a:lstStyle/>
+                    <a:p>
+                      <a:endParaRPr lang="en-US" sz="1000" dirty="0"/>
+                    </a:p>
+                  </a:txBody>
+                  <a:tcPr/>
+                </a:tc>
+                <a:tc>
+                  <a:txBody>
+                    <a:bodyPr/>
+                    <a:lstStyle/>
+                    <a:p>
+                      <a:endParaRPr lang="en-US" sz="1000" dirty="0"/>
+                    </a:p>
+                  </a:txBody>
+                  <a:tcPr/>
+                </a:tc>
+                <a:tc>
+                  <a:txBody>
+                    <a:bodyPr/>
+                    <a:lstStyle/>
+                    <a:p>
+                      <a:endParaRPr lang="en-US" sz="1000" dirty="0"/>
+                    </a:p>
+                  </a:txBody>
+                  <a:tcPr/>
+                </a:tc>
+                <a:tc>
+                  <a:txBody>
+                    <a:bodyPr/>
+                    <a:lstStyle/>
+                    <a:p>
+                      <a:endParaRPr lang="en-US" sz="1000" dirty="0"/>
+                    </a:p>
+                  </a:txBody>
+                  <a:tcPr/>
+                </a:tc>
+                <a:tc>
+                  <a:txBody>
+                    <a:bodyPr/>
+                    <a:lstStyle/>
+                    <a:p>
+                      <a:endParaRPr lang="en-US" sz="1000" dirty="0"/>
+                    </a:p>
+                  </a:txBody>
+                  <a:tcPr/>
+                </a:tc>
+                <a:tc>
+                  <a:txBody>
+                    <a:bodyPr/>
+                    <a:lstStyle/>
+                    <a:p>
+                      <a:endParaRPr lang="en-US" sz="1000" dirty="0"/>
+                    </a:p>
+                  </a:txBody>
+                  <a:tcPr/>
+                </a:tc>
+                <a:tc>
+                  <a:txBody>
+                    <a:bodyPr/>
+                    <a:lstStyle/>
+                    <a:p>
+                      <a:endParaRPr lang="en-US" sz="1000" dirty="0"/>
+                    </a:p>
+                  </a:txBody>
+                  <a:tcPr/>
+                </a:tc>
+                <a:tc>
+                  <a:txBody>
+                    <a:bodyPr/>
+                    <a:lstStyle/>
+                    <a:p>
+                      <a:endParaRPr lang="en-US" sz="1000" dirty="0"/>
+                    </a:p>
+                  </a:txBody>
+                  <a:tcPr/>
+                </a:tc>
+                <a:tc>
+                  <a:txBody>
+                    <a:bodyPr/>
+                    <a:lstStyle/>
+                    <a:p>
+                      <a:endParaRPr lang="en-US" sz="1000" dirty="0"/>
+                    </a:p>
+                  </a:txBody>
+                  <a:tcPr/>
+                </a:tc>
+                <a:tc>
+                  <a:txBody>
+                    <a:bodyPr/>
+                    <a:lstStyle/>
+                    <a:p>
+                      <a:endParaRPr lang="en-US" sz="1000" dirty="0"/>
+                    </a:p>
+                  </a:txBody>
+                  <a:tcPr/>
+                </a:tc>
+                <a:tc>
+                  <a:txBody>
+                    <a:bodyPr/>
+                    <a:lstStyle/>
+                    <a:p>
+                      <a:endParaRPr lang="en-US" sz="1000" dirty="0"/>
+                    </a:p>
+                  </a:txBody>
+                  <a:tcPr/>
+                </a:tc>
+                <a:tc>
+                  <a:txBody>
+                    <a:bodyPr/>
+                    <a:lstStyle/>
+                    <a:p>
+                      <a:endParaRPr lang="en-US" sz="1000" dirty="0"/>
+                    </a:p>
+                  </a:txBody>
+                  <a:tcPr/>
+                </a:tc>
+                <a:tc>
+                  <a:txBody>
+                    <a:bodyPr/>
+                    <a:lstStyle/>
+                    <a:p>
+                      <a:endParaRPr lang="en-US" sz="1000" dirty="0"/>
+                    </a:p>
+                  </a:txBody>
+                  <a:tcPr/>
+                </a:tc>
+                <a:extLst>
+                  <a:ext uri="{0D108BD9-81ED-4DB2-BD59-A6C34878D82A}">
+                    <a16:rowId xmlns:a16="http://schemas.microsoft.com/office/drawing/2014/main" val="1725276233"/>
+                  </a:ext>
+                </a:extLst>
+              </a:tr>
+              <a:tr h="280219">
+                <a:tc>
+                  <a:txBody>
+                    <a:bodyPr/>
+                    <a:lstStyle/>
+                    <a:p>
+                      <a:endParaRPr lang="en-US" sz="1000" dirty="0"/>
+                    </a:p>
+                  </a:txBody>
+                  <a:tcPr/>
+                </a:tc>
+                <a:tc>
+                  <a:txBody>
+                    <a:bodyPr/>
+                    <a:lstStyle/>
+                    <a:p>
+                      <a:endParaRPr lang="en-US" sz="1000" dirty="0"/>
+                    </a:p>
+                  </a:txBody>
+                  <a:tcPr/>
+                </a:tc>
+                <a:tc>
+                  <a:txBody>
+                    <a:bodyPr/>
+                    <a:lstStyle/>
+                    <a:p>
+                      <a:endParaRPr lang="en-US" sz="1000" dirty="0"/>
+                    </a:p>
+                  </a:txBody>
+                  <a:tcPr/>
+                </a:tc>
+                <a:tc>
+                  <a:txBody>
+                    <a:bodyPr/>
+                    <a:lstStyle/>
+                    <a:p>
+                      <a:endParaRPr lang="en-US" sz="1000" dirty="0"/>
+                    </a:p>
+                  </a:txBody>
+                  <a:tcPr/>
+                </a:tc>
+                <a:tc>
+                  <a:txBody>
+                    <a:bodyPr/>
+                    <a:lstStyle/>
+                    <a:p>
+                      <a:endParaRPr lang="en-US" sz="1000" dirty="0"/>
+                    </a:p>
+                  </a:txBody>
+                  <a:tcPr/>
+                </a:tc>
+                <a:tc>
+                  <a:txBody>
+                    <a:bodyPr/>
+                    <a:lstStyle/>
+                    <a:p>
+                      <a:endParaRPr lang="en-US" sz="1000" dirty="0"/>
+                    </a:p>
+                  </a:txBody>
+                  <a:tcPr/>
+                </a:tc>
+                <a:tc>
+                  <a:txBody>
+                    <a:bodyPr/>
+                    <a:lstStyle/>
+                    <a:p>
+                      <a:endParaRPr lang="en-US" sz="1000" dirty="0"/>
+                    </a:p>
+                  </a:txBody>
+                  <a:tcPr/>
+                </a:tc>
+                <a:tc>
+                  <a:txBody>
+                    <a:bodyPr/>
+                    <a:lstStyle/>
+                    <a:p>
+                      <a:endParaRPr lang="en-US" sz="1000" dirty="0"/>
+                    </a:p>
+                  </a:txBody>
+                  <a:tcPr/>
+                </a:tc>
+                <a:tc>
+                  <a:txBody>
+                    <a:bodyPr/>
+                    <a:lstStyle/>
+                    <a:p>
+                      <a:endParaRPr lang="en-US" sz="1000" dirty="0"/>
+                    </a:p>
+                  </a:txBody>
+                  <a:tcPr/>
+                </a:tc>
+                <a:tc>
+                  <a:txBody>
+                    <a:bodyPr/>
+                    <a:lstStyle/>
+                    <a:p>
+                      <a:endParaRPr lang="en-US" sz="1000" dirty="0"/>
+                    </a:p>
+                  </a:txBody>
+                  <a:tcPr/>
+                </a:tc>
+                <a:tc>
+                  <a:txBody>
+                    <a:bodyPr/>
+                    <a:lstStyle/>
+                    <a:p>
+                      <a:endParaRPr lang="en-US" sz="1000" dirty="0"/>
+                    </a:p>
+                  </a:txBody>
+                  <a:tcPr/>
+                </a:tc>
+                <a:tc>
+                  <a:txBody>
+                    <a:bodyPr/>
+                    <a:lstStyle/>
+                    <a:p>
+                      <a:endParaRPr lang="en-US" sz="1000" dirty="0"/>
+                    </a:p>
+                  </a:txBody>
+                  <a:tcPr/>
+                </a:tc>
+                <a:tc>
+                  <a:txBody>
+                    <a:bodyPr/>
+                    <a:lstStyle/>
+                    <a:p>
+                      <a:endParaRPr lang="en-US" sz="1000" dirty="0"/>
+                    </a:p>
+                  </a:txBody>
+                  <a:tcPr/>
+                </a:tc>
+                <a:tc>
+                  <a:txBody>
+                    <a:bodyPr/>
+                    <a:lstStyle/>
+                    <a:p>
+                      <a:endParaRPr lang="en-US" sz="1000" dirty="0"/>
+                    </a:p>
+                  </a:txBody>
+                  <a:tcPr/>
+                </a:tc>
+                <a:tc>
+                  <a:txBody>
+                    <a:bodyPr/>
+                    <a:lstStyle/>
+                    <a:p>
+                      <a:endParaRPr lang="en-US" sz="1000" dirty="0"/>
+                    </a:p>
+                  </a:txBody>
+                  <a:tcPr/>
+                </a:tc>
+                <a:extLst>
+                  <a:ext uri="{0D108BD9-81ED-4DB2-BD59-A6C34878D82A}">
+                    <a16:rowId xmlns:a16="http://schemas.microsoft.com/office/drawing/2014/main" val="1432255915"/>
+                  </a:ext>
+                </a:extLst>
+              </a:tr>
+              <a:tr h="280219">
+                <a:tc>
+                  <a:txBody>
+                    <a:bodyPr/>
+                    <a:lstStyle/>
+                    <a:p>
+                      <a:endParaRPr lang="en-US" sz="1000" dirty="0"/>
+                    </a:p>
+                  </a:txBody>
+                  <a:tcPr/>
+                </a:tc>
+                <a:tc>
+                  <a:txBody>
+                    <a:bodyPr/>
+                    <a:lstStyle/>
+                    <a:p>
+                      <a:endParaRPr lang="en-US" sz="1000" dirty="0"/>
+                    </a:p>
+                  </a:txBody>
+                  <a:tcPr/>
+                </a:tc>
+                <a:tc>
+                  <a:txBody>
+                    <a:bodyPr/>
+                    <a:lstStyle/>
+                    <a:p>
+                      <a:endParaRPr lang="en-US" sz="1000" dirty="0"/>
+                    </a:p>
+                  </a:txBody>
+                  <a:tcPr/>
+                </a:tc>
+                <a:tc>
+                  <a:txBody>
+                    <a:bodyPr/>
+                    <a:lstStyle/>
+                    <a:p>
+                      <a:endParaRPr lang="en-US" sz="1000" dirty="0"/>
+                    </a:p>
+                  </a:txBody>
+                  <a:tcPr/>
+                </a:tc>
+                <a:tc>
+                  <a:txBody>
+                    <a:bodyPr/>
+                    <a:lstStyle/>
+                    <a:p>
+                      <a:endParaRPr lang="en-US" sz="1000" dirty="0"/>
+                    </a:p>
+                  </a:txBody>
+                  <a:tcPr/>
+                </a:tc>
+                <a:tc>
+                  <a:txBody>
+                    <a:bodyPr/>
+                    <a:lstStyle/>
+                    <a:p>
+                      <a:endParaRPr lang="en-US" sz="1000" dirty="0"/>
+                    </a:p>
+                  </a:txBody>
+                  <a:tcPr/>
+                </a:tc>
+                <a:tc>
+                  <a:txBody>
+                    <a:bodyPr/>
+                    <a:lstStyle/>
+                    <a:p>
+                      <a:endParaRPr lang="en-US" sz="1000" dirty="0"/>
+                    </a:p>
+                  </a:txBody>
+                  <a:tcPr/>
+                </a:tc>
+                <a:tc>
+                  <a:txBody>
+                    <a:bodyPr/>
+                    <a:lstStyle/>
+                    <a:p>
+                      <a:endParaRPr lang="en-US" sz="1000" dirty="0"/>
+                    </a:p>
+                  </a:txBody>
+                  <a:tcPr/>
+                </a:tc>
+                <a:tc>
+                  <a:txBody>
+                    <a:bodyPr/>
+                    <a:lstStyle/>
+                    <a:p>
+                      <a:endParaRPr lang="en-US" sz="1000" dirty="0"/>
+                    </a:p>
+                  </a:txBody>
+                  <a:tcPr/>
+                </a:tc>
+                <a:tc>
+                  <a:txBody>
+                    <a:bodyPr/>
+                    <a:lstStyle/>
+                    <a:p>
+                      <a:endParaRPr lang="en-US" sz="1000" dirty="0"/>
+                    </a:p>
+                  </a:txBody>
+                  <a:tcPr/>
+                </a:tc>
+                <a:tc>
+                  <a:txBody>
+                    <a:bodyPr/>
+                    <a:lstStyle/>
+                    <a:p>
+                      <a:endParaRPr lang="en-US" sz="1000" dirty="0"/>
+                    </a:p>
+                  </a:txBody>
+                  <a:tcPr/>
+                </a:tc>
+                <a:tc>
+                  <a:txBody>
+                    <a:bodyPr/>
+                    <a:lstStyle/>
+                    <a:p>
+                      <a:endParaRPr lang="en-US" sz="1000" dirty="0"/>
+                    </a:p>
+                  </a:txBody>
+                  <a:tcPr/>
+                </a:tc>
+                <a:tc>
+                  <a:txBody>
+                    <a:bodyPr/>
+                    <a:lstStyle/>
+                    <a:p>
+                      <a:endParaRPr lang="en-US" sz="1000" dirty="0"/>
+                    </a:p>
+                  </a:txBody>
+                  <a:tcPr/>
+                </a:tc>
+                <a:tc>
+                  <a:txBody>
+                    <a:bodyPr/>
+                    <a:lstStyle/>
+                    <a:p>
+                      <a:endParaRPr lang="en-US" sz="1000" dirty="0"/>
+                    </a:p>
+                  </a:txBody>
+                  <a:tcPr/>
+                </a:tc>
+                <a:tc>
+                  <a:txBody>
+                    <a:bodyPr/>
+                    <a:lstStyle/>
+                    <a:p>
+                      <a:endParaRPr lang="en-US" sz="1000" dirty="0"/>
+                    </a:p>
+                  </a:txBody>
+                  <a:tcPr/>
+                </a:tc>
+                <a:extLst>
+                  <a:ext uri="{0D108BD9-81ED-4DB2-BD59-A6C34878D82A}">
+                    <a16:rowId xmlns:a16="http://schemas.microsoft.com/office/drawing/2014/main" val="3432141755"/>
+                  </a:ext>
+                </a:extLst>
+              </a:tr>
+              <a:tr h="280219">
+                <a:tc>
+                  <a:txBody>
+                    <a:bodyPr/>
+                    <a:lstStyle/>
+                    <a:p>
+                      <a:endParaRPr lang="en-US" sz="1000" dirty="0"/>
+                    </a:p>
+                  </a:txBody>
+                  <a:tcPr/>
+                </a:tc>
+                <a:tc>
+                  <a:txBody>
+                    <a:bodyPr/>
+                    <a:lstStyle/>
+                    <a:p>
+                      <a:endParaRPr lang="en-US" sz="1000" dirty="0"/>
+                    </a:p>
+                  </a:txBody>
+                  <a:tcPr/>
+                </a:tc>
+                <a:tc>
+                  <a:txBody>
+                    <a:bodyPr/>
+                    <a:lstStyle/>
+                    <a:p>
+                      <a:endParaRPr lang="en-US" sz="1000" dirty="0"/>
+                    </a:p>
+                  </a:txBody>
+                  <a:tcPr/>
+                </a:tc>
+                <a:tc>
+                  <a:txBody>
+                    <a:bodyPr/>
+                    <a:lstStyle/>
+                    <a:p>
+                      <a:endParaRPr lang="en-US" sz="1000" dirty="0"/>
+                    </a:p>
+                  </a:txBody>
+                  <a:tcPr/>
+                </a:tc>
+                <a:tc>
+                  <a:txBody>
+                    <a:bodyPr/>
+                    <a:lstStyle/>
+                    <a:p>
+                      <a:endParaRPr lang="en-US" sz="1000" dirty="0"/>
+                    </a:p>
+                  </a:txBody>
+                  <a:tcPr/>
+                </a:tc>
+                <a:tc>
+                  <a:txBody>
+                    <a:bodyPr/>
+                    <a:lstStyle/>
+                    <a:p>
+                      <a:endParaRPr lang="en-US" sz="1000" dirty="0"/>
+                    </a:p>
+                  </a:txBody>
+                  <a:tcPr/>
+                </a:tc>
+                <a:tc>
+                  <a:txBody>
+                    <a:bodyPr/>
+                    <a:lstStyle/>
+                    <a:p>
+                      <a:endParaRPr lang="en-US" sz="1000" dirty="0"/>
+                    </a:p>
+                  </a:txBody>
+                  <a:tcPr/>
+                </a:tc>
+                <a:tc>
+                  <a:txBody>
+                    <a:bodyPr/>
+                    <a:lstStyle/>
+                    <a:p>
+                      <a:endParaRPr lang="en-US" sz="1000" dirty="0"/>
+                    </a:p>
+                  </a:txBody>
+                  <a:tcPr/>
+                </a:tc>
+                <a:tc>
+                  <a:txBody>
+                    <a:bodyPr/>
+                    <a:lstStyle/>
+                    <a:p>
+                      <a:endParaRPr lang="en-US" sz="1000" dirty="0"/>
+                    </a:p>
+                  </a:txBody>
+                  <a:tcPr/>
+                </a:tc>
+                <a:tc>
+                  <a:txBody>
+                    <a:bodyPr/>
+                    <a:lstStyle/>
+                    <a:p>
+                      <a:endParaRPr lang="en-US" sz="1000" dirty="0"/>
+                    </a:p>
+                  </a:txBody>
+                  <a:tcPr/>
+                </a:tc>
+                <a:tc>
+                  <a:txBody>
+                    <a:bodyPr/>
+                    <a:lstStyle/>
+                    <a:p>
+                      <a:endParaRPr lang="en-US" sz="1000" dirty="0"/>
+                    </a:p>
+                  </a:txBody>
+                  <a:tcPr/>
+                </a:tc>
+                <a:tc>
+                  <a:txBody>
+                    <a:bodyPr/>
+                    <a:lstStyle/>
+                    <a:p>
+                      <a:endParaRPr lang="en-US" sz="1000" dirty="0"/>
+                    </a:p>
+                  </a:txBody>
+                  <a:tcPr/>
+                </a:tc>
+                <a:tc>
+                  <a:txBody>
+                    <a:bodyPr/>
+                    <a:lstStyle/>
+                    <a:p>
+                      <a:endParaRPr lang="en-US" sz="1000" dirty="0"/>
+                    </a:p>
+                  </a:txBody>
+                  <a:tcPr/>
+                </a:tc>
+                <a:tc>
+                  <a:txBody>
+                    <a:bodyPr/>
+                    <a:lstStyle/>
+                    <a:p>
+                      <a:endParaRPr lang="en-US" sz="1000" dirty="0"/>
+                    </a:p>
+                  </a:txBody>
+                  <a:tcPr/>
+                </a:tc>
+                <a:tc>
+                  <a:txBody>
+                    <a:bodyPr/>
+                    <a:lstStyle/>
+                    <a:p>
+                      <a:endParaRPr lang="en-US" sz="1000" dirty="0"/>
+                    </a:p>
+                  </a:txBody>
+                  <a:tcPr/>
+                </a:tc>
+                <a:extLst>
+                  <a:ext uri="{0D108BD9-81ED-4DB2-BD59-A6C34878D82A}">
+                    <a16:rowId xmlns:a16="http://schemas.microsoft.com/office/drawing/2014/main" val="1871396410"/>
+                  </a:ext>
+                </a:extLst>
+              </a:tr>
+              <a:tr h="280219">
+                <a:tc>
+                  <a:txBody>
+                    <a:bodyPr/>
+                    <a:lstStyle/>
+                    <a:p>
+                      <a:endParaRPr lang="en-US" sz="1000" dirty="0"/>
+                    </a:p>
+                  </a:txBody>
+                  <a:tcPr/>
+                </a:tc>
+                <a:tc>
+                  <a:txBody>
+                    <a:bodyPr/>
+                    <a:lstStyle/>
+                    <a:p>
+                      <a:endParaRPr lang="en-US" sz="1000" dirty="0"/>
+                    </a:p>
+                  </a:txBody>
+                  <a:tcPr/>
+                </a:tc>
+                <a:tc>
+                  <a:txBody>
+                    <a:bodyPr/>
+                    <a:lstStyle/>
+                    <a:p>
+                      <a:endParaRPr lang="en-US" sz="1000" dirty="0"/>
+                    </a:p>
+                  </a:txBody>
+                  <a:tcPr/>
+                </a:tc>
+                <a:tc>
+                  <a:txBody>
+                    <a:bodyPr/>
+                    <a:lstStyle/>
+                    <a:p>
+                      <a:endParaRPr lang="en-US" sz="1000" dirty="0"/>
+                    </a:p>
+                  </a:txBody>
+                  <a:tcPr/>
+                </a:tc>
+                <a:tc>
+                  <a:txBody>
+                    <a:bodyPr/>
+                    <a:lstStyle/>
+                    <a:p>
+                      <a:endParaRPr lang="en-US" sz="1000" dirty="0"/>
+                    </a:p>
+                  </a:txBody>
+                  <a:tcPr/>
+                </a:tc>
+                <a:tc>
+                  <a:txBody>
+                    <a:bodyPr/>
+                    <a:lstStyle/>
+                    <a:p>
+                      <a:endParaRPr lang="en-US" sz="1000" dirty="0"/>
+                    </a:p>
+                  </a:txBody>
+                  <a:tcPr/>
+                </a:tc>
+                <a:tc>
+                  <a:txBody>
+                    <a:bodyPr/>
+                    <a:lstStyle/>
+                    <a:p>
+                      <a:endParaRPr lang="en-US" sz="1000" dirty="0"/>
+                    </a:p>
+                  </a:txBody>
+                  <a:tcPr/>
+                </a:tc>
+                <a:tc>
+                  <a:txBody>
+                    <a:bodyPr/>
+                    <a:lstStyle/>
+                    <a:p>
+                      <a:endParaRPr lang="en-US" sz="1000" dirty="0"/>
+                    </a:p>
+                  </a:txBody>
+                  <a:tcPr/>
+                </a:tc>
+                <a:tc>
+                  <a:txBody>
+                    <a:bodyPr/>
+                    <a:lstStyle/>
+                    <a:p>
+                      <a:endParaRPr lang="en-US" sz="1000" dirty="0"/>
+                    </a:p>
+                  </a:txBody>
+                  <a:tcPr/>
+                </a:tc>
+                <a:tc>
+                  <a:txBody>
+                    <a:bodyPr/>
+                    <a:lstStyle/>
+                    <a:p>
+                      <a:endParaRPr lang="en-US" sz="1000" dirty="0"/>
+                    </a:p>
+                  </a:txBody>
+                  <a:tcPr/>
+                </a:tc>
+                <a:tc>
+                  <a:txBody>
+                    <a:bodyPr/>
+                    <a:lstStyle/>
+                    <a:p>
+                      <a:endParaRPr lang="en-US" sz="1000" dirty="0"/>
+                    </a:p>
+                  </a:txBody>
+                  <a:tcPr/>
+                </a:tc>
+                <a:tc>
+                  <a:txBody>
+                    <a:bodyPr/>
+                    <a:lstStyle/>
+                    <a:p>
+                      <a:endParaRPr lang="en-US" sz="1000" dirty="0"/>
+                    </a:p>
+                  </a:txBody>
+                  <a:tcPr/>
+                </a:tc>
+                <a:tc>
+                  <a:txBody>
+                    <a:bodyPr/>
+                    <a:lstStyle/>
+                    <a:p>
+                      <a:endParaRPr lang="en-US" sz="1000" dirty="0"/>
+                    </a:p>
+                  </a:txBody>
+                  <a:tcPr/>
+                </a:tc>
+                <a:tc>
+                  <a:txBody>
+                    <a:bodyPr/>
+                    <a:lstStyle/>
+                    <a:p>
+                      <a:endParaRPr lang="en-US" sz="1000" dirty="0"/>
+                    </a:p>
+                  </a:txBody>
+                  <a:tcPr/>
+                </a:tc>
+                <a:tc>
+                  <a:txBody>
+                    <a:bodyPr/>
+                    <a:lstStyle/>
+                    <a:p>
+                      <a:endParaRPr lang="en-US" sz="1000" dirty="0"/>
+                    </a:p>
+                  </a:txBody>
+                  <a:tcPr/>
+                </a:tc>
+                <a:extLst>
+                  <a:ext uri="{0D108BD9-81ED-4DB2-BD59-A6C34878D82A}">
+                    <a16:rowId xmlns:a16="http://schemas.microsoft.com/office/drawing/2014/main" val="3783128536"/>
+                  </a:ext>
+                </a:extLst>
+              </a:tr>
+              <a:tr h="280219">
+                <a:tc>
+                  <a:txBody>
+                    <a:bodyPr/>
+                    <a:lstStyle/>
+                    <a:p>
+                      <a:endParaRPr lang="en-US" sz="1000" dirty="0"/>
+                    </a:p>
+                  </a:txBody>
+                  <a:tcPr/>
+                </a:tc>
+                <a:tc>
+                  <a:txBody>
+                    <a:bodyPr/>
+                    <a:lstStyle/>
+                    <a:p>
+                      <a:endParaRPr lang="en-US" sz="1000" dirty="0"/>
+                    </a:p>
+                  </a:txBody>
+                  <a:tcPr/>
+                </a:tc>
+                <a:tc>
+                  <a:txBody>
+                    <a:bodyPr/>
+                    <a:lstStyle/>
+                    <a:p>
+                      <a:endParaRPr lang="en-US" sz="1000" dirty="0"/>
+                    </a:p>
+                  </a:txBody>
+                  <a:tcPr/>
+                </a:tc>
+                <a:tc>
+                  <a:txBody>
+                    <a:bodyPr/>
+                    <a:lstStyle/>
+                    <a:p>
+                      <a:endParaRPr lang="en-US" sz="1000" dirty="0"/>
+                    </a:p>
+                  </a:txBody>
+                  <a:tcPr/>
+                </a:tc>
+                <a:tc>
+                  <a:txBody>
+                    <a:bodyPr/>
+                    <a:lstStyle/>
+                    <a:p>
+                      <a:endParaRPr lang="en-US" sz="1000" dirty="0"/>
+                    </a:p>
+                  </a:txBody>
+                  <a:tcPr/>
+                </a:tc>
+                <a:tc>
+                  <a:txBody>
+                    <a:bodyPr/>
+                    <a:lstStyle/>
+                    <a:p>
+                      <a:endParaRPr lang="en-US" sz="1000" dirty="0"/>
+                    </a:p>
+                  </a:txBody>
+                  <a:tcPr/>
+                </a:tc>
+                <a:tc>
+                  <a:txBody>
+                    <a:bodyPr/>
+                    <a:lstStyle/>
+                    <a:p>
+                      <a:endParaRPr lang="en-US" sz="1000" dirty="0"/>
+                    </a:p>
+                  </a:txBody>
+                  <a:tcPr/>
+                </a:tc>
+                <a:tc>
+                  <a:txBody>
+                    <a:bodyPr/>
+                    <a:lstStyle/>
+                    <a:p>
+                      <a:endParaRPr lang="en-US" sz="1000" dirty="0"/>
+                    </a:p>
+                  </a:txBody>
+                  <a:tcPr/>
+                </a:tc>
+                <a:tc>
+                  <a:txBody>
+                    <a:bodyPr/>
+                    <a:lstStyle/>
+                    <a:p>
+                      <a:endParaRPr lang="en-US" sz="1000" dirty="0"/>
+                    </a:p>
+                  </a:txBody>
+                  <a:tcPr/>
+                </a:tc>
+                <a:tc>
+                  <a:txBody>
+                    <a:bodyPr/>
+                    <a:lstStyle/>
+                    <a:p>
+                      <a:endParaRPr lang="en-US" sz="1000" dirty="0"/>
+                    </a:p>
+                  </a:txBody>
+                  <a:tcPr/>
+                </a:tc>
+                <a:tc>
+                  <a:txBody>
+                    <a:bodyPr/>
+                    <a:lstStyle/>
+                    <a:p>
+                      <a:endParaRPr lang="en-US" sz="1000" dirty="0"/>
+                    </a:p>
+                  </a:txBody>
+                  <a:tcPr/>
+                </a:tc>
+                <a:tc>
+                  <a:txBody>
+                    <a:bodyPr/>
+                    <a:lstStyle/>
+                    <a:p>
+                      <a:endParaRPr lang="en-US" sz="1000" dirty="0"/>
+                    </a:p>
+                  </a:txBody>
+                  <a:tcPr/>
+                </a:tc>
+                <a:tc>
+                  <a:txBody>
+                    <a:bodyPr/>
+                    <a:lstStyle/>
+                    <a:p>
+                      <a:endParaRPr lang="en-US" sz="1000" dirty="0"/>
+                    </a:p>
+                  </a:txBody>
+                  <a:tcPr/>
+                </a:tc>
+                <a:tc>
+                  <a:txBody>
+                    <a:bodyPr/>
+                    <a:lstStyle/>
+                    <a:p>
+                      <a:endParaRPr lang="en-US" sz="1000" dirty="0"/>
+                    </a:p>
+                  </a:txBody>
+                  <a:tcPr/>
+                </a:tc>
+                <a:tc>
+                  <a:txBody>
+                    <a:bodyPr/>
+                    <a:lstStyle/>
+                    <a:p>
+                      <a:endParaRPr lang="en-US" sz="1000" dirty="0"/>
+                    </a:p>
+                  </a:txBody>
+                  <a:tcPr/>
+                </a:tc>
+                <a:extLst>
+                  <a:ext uri="{0D108BD9-81ED-4DB2-BD59-A6C34878D82A}">
+                    <a16:rowId xmlns:a16="http://schemas.microsoft.com/office/drawing/2014/main" val="97941601"/>
+                  </a:ext>
+                </a:extLst>
+              </a:tr>
+              <a:tr h="280219">
+                <a:tc>
+                  <a:txBody>
+                    <a:bodyPr/>
+                    <a:lstStyle/>
+                    <a:p>
+                      <a:endParaRPr lang="en-US" sz="1000" dirty="0"/>
+                    </a:p>
+                  </a:txBody>
+                  <a:tcPr/>
+                </a:tc>
+                <a:tc>
+                  <a:txBody>
+                    <a:bodyPr/>
+                    <a:lstStyle/>
+                    <a:p>
+                      <a:endParaRPr lang="en-US" sz="1000" dirty="0"/>
+                    </a:p>
+                  </a:txBody>
+                  <a:tcPr/>
+                </a:tc>
+                <a:tc>
+                  <a:txBody>
+                    <a:bodyPr/>
+                    <a:lstStyle/>
+                    <a:p>
+                      <a:endParaRPr lang="en-US" sz="1000" dirty="0"/>
+                    </a:p>
+                  </a:txBody>
+                  <a:tcPr/>
+                </a:tc>
+                <a:tc>
+                  <a:txBody>
+                    <a:bodyPr/>
+                    <a:lstStyle/>
+                    <a:p>
+                      <a:endParaRPr lang="en-US" sz="1000" dirty="0"/>
+                    </a:p>
+                  </a:txBody>
+                  <a:tcPr/>
+                </a:tc>
+                <a:tc>
+                  <a:txBody>
+                    <a:bodyPr/>
+                    <a:lstStyle/>
+                    <a:p>
+                      <a:endParaRPr lang="en-US" sz="1000" dirty="0"/>
+                    </a:p>
+                  </a:txBody>
+                  <a:tcPr/>
+                </a:tc>
+                <a:tc>
+                  <a:txBody>
+                    <a:bodyPr/>
+                    <a:lstStyle/>
+                    <a:p>
+                      <a:endParaRPr lang="en-US" sz="1000" dirty="0"/>
+                    </a:p>
+                  </a:txBody>
+                  <a:tcPr/>
+                </a:tc>
+                <a:tc>
+                  <a:txBody>
+                    <a:bodyPr/>
+                    <a:lstStyle/>
+                    <a:p>
+                      <a:endParaRPr lang="en-US" sz="1000" dirty="0"/>
+                    </a:p>
+                  </a:txBody>
+                  <a:tcPr/>
+                </a:tc>
+                <a:tc>
+                  <a:txBody>
+                    <a:bodyPr/>
+                    <a:lstStyle/>
+                    <a:p>
+                      <a:endParaRPr lang="en-US" sz="1000" dirty="0"/>
+                    </a:p>
+                  </a:txBody>
+                  <a:tcPr/>
+                </a:tc>
+                <a:tc>
+                  <a:txBody>
+                    <a:bodyPr/>
+                    <a:lstStyle/>
+                    <a:p>
+                      <a:endParaRPr lang="en-US" sz="1000" dirty="0"/>
+                    </a:p>
+                  </a:txBody>
+                  <a:tcPr/>
+                </a:tc>
+                <a:tc>
+                  <a:txBody>
+                    <a:bodyPr/>
+                    <a:lstStyle/>
+                    <a:p>
+                      <a:endParaRPr lang="en-US" sz="1000" dirty="0"/>
+                    </a:p>
+                  </a:txBody>
+                  <a:tcPr/>
+                </a:tc>
+                <a:tc>
+                  <a:txBody>
+                    <a:bodyPr/>
+                    <a:lstStyle/>
+                    <a:p>
+                      <a:endParaRPr lang="en-US" sz="1000" dirty="0"/>
+                    </a:p>
+                  </a:txBody>
+                  <a:tcPr/>
+                </a:tc>
+                <a:tc>
+                  <a:txBody>
+                    <a:bodyPr/>
+                    <a:lstStyle/>
+                    <a:p>
+                      <a:endParaRPr lang="en-US" sz="1000" dirty="0"/>
+                    </a:p>
+                  </a:txBody>
+                  <a:tcPr/>
+                </a:tc>
+                <a:tc>
+                  <a:txBody>
+                    <a:bodyPr/>
+                    <a:lstStyle/>
+                    <a:p>
+                      <a:endParaRPr lang="en-US" sz="1000" dirty="0"/>
+                    </a:p>
+                  </a:txBody>
+                  <a:tcPr/>
+                </a:tc>
+                <a:tc>
+                  <a:txBody>
+                    <a:bodyPr/>
+                    <a:lstStyle/>
+                    <a:p>
+                      <a:endParaRPr lang="en-US" sz="1000" dirty="0"/>
+                    </a:p>
+                  </a:txBody>
+                  <a:tcPr/>
+                </a:tc>
+                <a:tc>
+                  <a:txBody>
+                    <a:bodyPr/>
+                    <a:lstStyle/>
+                    <a:p>
+                      <a:endParaRPr lang="en-US" sz="1000" dirty="0"/>
+                    </a:p>
+                  </a:txBody>
+                  <a:tcPr/>
+                </a:tc>
+                <a:extLst>
+                  <a:ext uri="{0D108BD9-81ED-4DB2-BD59-A6C34878D82A}">
+                    <a16:rowId xmlns:a16="http://schemas.microsoft.com/office/drawing/2014/main" val="2260593277"/>
+                  </a:ext>
+                </a:extLst>
+              </a:tr>
+              <a:tr h="280219">
+                <a:tc>
+                  <a:txBody>
+                    <a:bodyPr/>
+                    <a:lstStyle/>
+                    <a:p>
+                      <a:endParaRPr lang="en-US" sz="1000" dirty="0"/>
+                    </a:p>
+                  </a:txBody>
+                  <a:tcPr/>
+                </a:tc>
+                <a:tc>
+                  <a:txBody>
+                    <a:bodyPr/>
+                    <a:lstStyle/>
+                    <a:p>
+                      <a:endParaRPr lang="en-US" sz="1000" dirty="0"/>
+                    </a:p>
+                  </a:txBody>
+                  <a:tcPr/>
+                </a:tc>
+                <a:tc>
+                  <a:txBody>
+                    <a:bodyPr/>
+                    <a:lstStyle/>
+                    <a:p>
+                      <a:endParaRPr lang="en-US" sz="1000" dirty="0"/>
+                    </a:p>
+                  </a:txBody>
+                  <a:tcPr/>
+                </a:tc>
+                <a:tc>
+                  <a:txBody>
+                    <a:bodyPr/>
+                    <a:lstStyle/>
+                    <a:p>
+                      <a:endParaRPr lang="en-US" sz="1000" dirty="0"/>
+                    </a:p>
+                  </a:txBody>
+                  <a:tcPr/>
+                </a:tc>
+                <a:tc>
+                  <a:txBody>
+                    <a:bodyPr/>
+                    <a:lstStyle/>
+                    <a:p>
+                      <a:endParaRPr lang="en-US" sz="1000" dirty="0"/>
+                    </a:p>
+                  </a:txBody>
+                  <a:tcPr/>
+                </a:tc>
+                <a:tc>
+                  <a:txBody>
+                    <a:bodyPr/>
+                    <a:lstStyle/>
+                    <a:p>
+                      <a:endParaRPr lang="en-US" sz="1000" dirty="0"/>
+                    </a:p>
+                  </a:txBody>
+                  <a:tcPr/>
+                </a:tc>
+                <a:tc>
+                  <a:txBody>
+                    <a:bodyPr/>
+                    <a:lstStyle/>
+                    <a:p>
+                      <a:endParaRPr lang="en-US" sz="1000" dirty="0"/>
+                    </a:p>
+                  </a:txBody>
+                  <a:tcPr/>
+                </a:tc>
+                <a:tc>
+                  <a:txBody>
+                    <a:bodyPr/>
+                    <a:lstStyle/>
+                    <a:p>
+                      <a:endParaRPr lang="en-US" sz="1000" dirty="0"/>
+                    </a:p>
+                  </a:txBody>
+                  <a:tcPr/>
+                </a:tc>
+                <a:tc>
+                  <a:txBody>
+                    <a:bodyPr/>
+                    <a:lstStyle/>
+                    <a:p>
+                      <a:endParaRPr lang="en-US" sz="1000" dirty="0"/>
+                    </a:p>
+                  </a:txBody>
+                  <a:tcPr/>
+                </a:tc>
+                <a:tc>
+                  <a:txBody>
+                    <a:bodyPr/>
+                    <a:lstStyle/>
+                    <a:p>
+                      <a:endParaRPr lang="en-US" sz="1000" dirty="0"/>
+                    </a:p>
+                  </a:txBody>
+                  <a:tcPr/>
+                </a:tc>
+                <a:tc>
+                  <a:txBody>
+                    <a:bodyPr/>
+                    <a:lstStyle/>
+                    <a:p>
+                      <a:endParaRPr lang="en-US" sz="1000" dirty="0"/>
+                    </a:p>
+                  </a:txBody>
+                  <a:tcPr/>
+                </a:tc>
+                <a:tc>
+                  <a:txBody>
+                    <a:bodyPr/>
+                    <a:lstStyle/>
+                    <a:p>
+                      <a:endParaRPr lang="en-US" sz="1000" dirty="0"/>
+                    </a:p>
+                  </a:txBody>
+                  <a:tcPr/>
+                </a:tc>
+                <a:tc>
+                  <a:txBody>
+                    <a:bodyPr/>
+                    <a:lstStyle/>
+                    <a:p>
+                      <a:endParaRPr lang="en-US" sz="1000" dirty="0"/>
+                    </a:p>
+                  </a:txBody>
+                  <a:tcPr/>
+                </a:tc>
+                <a:tc>
+                  <a:txBody>
+                    <a:bodyPr/>
+                    <a:lstStyle/>
+                    <a:p>
+                      <a:endParaRPr lang="en-US" sz="1000" dirty="0"/>
+                    </a:p>
+                  </a:txBody>
+                  <a:tcPr/>
+                </a:tc>
+                <a:tc>
+                  <a:txBody>
+                    <a:bodyPr/>
+                    <a:lstStyle/>
+                    <a:p>
+                      <a:endParaRPr lang="en-US" sz="1000" dirty="0"/>
+                    </a:p>
+                  </a:txBody>
+                  <a:tcPr/>
+                </a:tc>
+                <a:extLst>
+                  <a:ext uri="{0D108BD9-81ED-4DB2-BD59-A6C34878D82A}">
+                    <a16:rowId xmlns:a16="http://schemas.microsoft.com/office/drawing/2014/main" val="3281224475"/>
+                  </a:ext>
+                </a:extLst>
+              </a:tr>
+              <a:tr h="280219">
+                <a:tc>
+                  <a:txBody>
+                    <a:bodyPr/>
+                    <a:lstStyle/>
+                    <a:p>
+                      <a:endParaRPr lang="en-US" sz="1000" dirty="0"/>
+                    </a:p>
+                  </a:txBody>
+                  <a:tcPr/>
+                </a:tc>
+                <a:tc>
+                  <a:txBody>
+                    <a:bodyPr/>
+                    <a:lstStyle/>
+                    <a:p>
+                      <a:endParaRPr lang="en-US" sz="1000" dirty="0"/>
+                    </a:p>
+                  </a:txBody>
+                  <a:tcPr/>
+                </a:tc>
+                <a:tc>
+                  <a:txBody>
+                    <a:bodyPr/>
+                    <a:lstStyle/>
+                    <a:p>
+                      <a:endParaRPr lang="en-US" sz="1000" dirty="0"/>
+                    </a:p>
+                  </a:txBody>
+                  <a:tcPr/>
+                </a:tc>
+                <a:tc>
+                  <a:txBody>
+                    <a:bodyPr/>
+                    <a:lstStyle/>
+                    <a:p>
+                      <a:endParaRPr lang="en-US" sz="1000" dirty="0"/>
+                    </a:p>
+                  </a:txBody>
+                  <a:tcPr/>
+                </a:tc>
+                <a:tc>
+                  <a:txBody>
+                    <a:bodyPr/>
+                    <a:lstStyle/>
+                    <a:p>
+                      <a:endParaRPr lang="en-US" sz="1000" dirty="0"/>
+                    </a:p>
+                  </a:txBody>
+                  <a:tcPr/>
+                </a:tc>
+                <a:tc>
+                  <a:txBody>
+                    <a:bodyPr/>
+                    <a:lstStyle/>
+                    <a:p>
+                      <a:endParaRPr lang="en-US" sz="1000" dirty="0"/>
+                    </a:p>
+                  </a:txBody>
+                  <a:tcPr/>
+                </a:tc>
+                <a:tc>
+                  <a:txBody>
+                    <a:bodyPr/>
+                    <a:lstStyle/>
+                    <a:p>
+                      <a:endParaRPr lang="en-US" sz="1000" dirty="0"/>
+                    </a:p>
+                  </a:txBody>
+                  <a:tcPr/>
+                </a:tc>
+                <a:tc>
+                  <a:txBody>
+                    <a:bodyPr/>
+                    <a:lstStyle/>
+                    <a:p>
+                      <a:endParaRPr lang="en-US" sz="1000" dirty="0"/>
+                    </a:p>
+                  </a:txBody>
+                  <a:tcPr/>
+                </a:tc>
+                <a:tc>
+                  <a:txBody>
+                    <a:bodyPr/>
+                    <a:lstStyle/>
+                    <a:p>
+                      <a:endParaRPr lang="en-US" sz="1000" dirty="0"/>
+                    </a:p>
+                  </a:txBody>
+                  <a:tcPr/>
+                </a:tc>
+                <a:tc>
+                  <a:txBody>
+                    <a:bodyPr/>
+                    <a:lstStyle/>
+                    <a:p>
+                      <a:endParaRPr lang="en-US" sz="1000" dirty="0"/>
+                    </a:p>
+                  </a:txBody>
+                  <a:tcPr/>
+                </a:tc>
+                <a:tc>
+                  <a:txBody>
+                    <a:bodyPr/>
+                    <a:lstStyle/>
+                    <a:p>
+                      <a:endParaRPr lang="en-US" sz="1000" dirty="0"/>
+                    </a:p>
+                  </a:txBody>
+                  <a:tcPr/>
+                </a:tc>
+                <a:tc>
+                  <a:txBody>
+                    <a:bodyPr/>
+                    <a:lstStyle/>
+                    <a:p>
+                      <a:endParaRPr lang="en-US" sz="1000" dirty="0"/>
+                    </a:p>
+                  </a:txBody>
+                  <a:tcPr/>
+                </a:tc>
+                <a:tc>
+                  <a:txBody>
+                    <a:bodyPr/>
+                    <a:lstStyle/>
+                    <a:p>
+                      <a:endParaRPr lang="en-US" sz="1000" dirty="0"/>
+                    </a:p>
+                  </a:txBody>
+                  <a:tcPr/>
+                </a:tc>
+                <a:tc>
+                  <a:txBody>
+                    <a:bodyPr/>
+                    <a:lstStyle/>
+                    <a:p>
+                      <a:endParaRPr lang="en-US" sz="1000" dirty="0"/>
+                    </a:p>
+                  </a:txBody>
+                  <a:tcPr/>
+                </a:tc>
+                <a:tc>
+                  <a:txBody>
+                    <a:bodyPr/>
+                    <a:lstStyle/>
+                    <a:p>
+                      <a:endParaRPr lang="en-US" sz="1000" dirty="0"/>
+                    </a:p>
+                  </a:txBody>
+                  <a:tcPr/>
+                </a:tc>
+                <a:extLst>
+                  <a:ext uri="{0D108BD9-81ED-4DB2-BD59-A6C34878D82A}">
+                    <a16:rowId xmlns:a16="http://schemas.microsoft.com/office/drawing/2014/main" val="521028205"/>
+                  </a:ext>
+                </a:extLst>
+              </a:tr>
+              <a:tr h="280219">
+                <a:tc>
+                  <a:txBody>
+                    <a:bodyPr/>
+                    <a:lstStyle/>
+                    <a:p>
+                      <a:endParaRPr lang="en-US" sz="1000" dirty="0"/>
+                    </a:p>
+                  </a:txBody>
+                  <a:tcPr/>
+                </a:tc>
+                <a:tc>
+                  <a:txBody>
+                    <a:bodyPr/>
+                    <a:lstStyle/>
+                    <a:p>
+                      <a:endParaRPr lang="en-US" sz="1000" dirty="0"/>
+                    </a:p>
+                  </a:txBody>
+                  <a:tcPr/>
+                </a:tc>
+                <a:tc>
+                  <a:txBody>
+                    <a:bodyPr/>
+                    <a:lstStyle/>
+                    <a:p>
+                      <a:endParaRPr lang="en-US" sz="1000" dirty="0"/>
+                    </a:p>
+                  </a:txBody>
+                  <a:tcPr/>
+                </a:tc>
+                <a:tc>
+                  <a:txBody>
+                    <a:bodyPr/>
+                    <a:lstStyle/>
+                    <a:p>
+                      <a:endParaRPr lang="en-US" sz="1000" dirty="0"/>
+                    </a:p>
+                  </a:txBody>
+                  <a:tcPr/>
+                </a:tc>
+                <a:tc>
+                  <a:txBody>
+                    <a:bodyPr/>
+                    <a:lstStyle/>
+                    <a:p>
+                      <a:endParaRPr lang="en-US" sz="1000" dirty="0"/>
+                    </a:p>
+                  </a:txBody>
+                  <a:tcPr/>
+                </a:tc>
+                <a:tc>
+                  <a:txBody>
+                    <a:bodyPr/>
+                    <a:lstStyle/>
+                    <a:p>
+                      <a:endParaRPr lang="en-US" sz="1000" dirty="0"/>
+                    </a:p>
+                  </a:txBody>
+                  <a:tcPr/>
+                </a:tc>
+                <a:tc>
+                  <a:txBody>
+                    <a:bodyPr/>
+                    <a:lstStyle/>
+                    <a:p>
+                      <a:endParaRPr lang="en-US" sz="1000" dirty="0"/>
+                    </a:p>
+                  </a:txBody>
+                  <a:tcPr/>
+                </a:tc>
+                <a:tc>
+                  <a:txBody>
+                    <a:bodyPr/>
+                    <a:lstStyle/>
+                    <a:p>
+                      <a:endParaRPr lang="en-US" sz="1000" dirty="0"/>
+                    </a:p>
+                  </a:txBody>
+                  <a:tcPr/>
+                </a:tc>
+                <a:tc>
+                  <a:txBody>
+                    <a:bodyPr/>
+                    <a:lstStyle/>
+                    <a:p>
+                      <a:endParaRPr lang="en-US" sz="1000" dirty="0"/>
+                    </a:p>
+                  </a:txBody>
+                  <a:tcPr/>
+                </a:tc>
+                <a:tc>
+                  <a:txBody>
+                    <a:bodyPr/>
+                    <a:lstStyle/>
+                    <a:p>
+                      <a:endParaRPr lang="en-US" sz="1000" dirty="0"/>
+                    </a:p>
+                  </a:txBody>
+                  <a:tcPr/>
+                </a:tc>
+                <a:tc>
+                  <a:txBody>
+                    <a:bodyPr/>
+                    <a:lstStyle/>
+                    <a:p>
+                      <a:endParaRPr lang="en-US" sz="1000" dirty="0"/>
+                    </a:p>
+                  </a:txBody>
+                  <a:tcPr/>
+                </a:tc>
+                <a:tc>
+                  <a:txBody>
+                    <a:bodyPr/>
+                    <a:lstStyle/>
+                    <a:p>
+                      <a:endParaRPr lang="en-US" sz="1000" dirty="0"/>
+                    </a:p>
+                  </a:txBody>
+                  <a:tcPr/>
+                </a:tc>
+                <a:tc>
+                  <a:txBody>
+                    <a:bodyPr/>
+                    <a:lstStyle/>
+                    <a:p>
+                      <a:endParaRPr lang="en-US" sz="1000" dirty="0"/>
+                    </a:p>
+                  </a:txBody>
+                  <a:tcPr/>
+                </a:tc>
+                <a:tc>
+                  <a:txBody>
+                    <a:bodyPr/>
+                    <a:lstStyle/>
+                    <a:p>
+                      <a:endParaRPr lang="en-US" sz="1000" dirty="0"/>
+                    </a:p>
+                  </a:txBody>
+                  <a:tcPr/>
+                </a:tc>
+                <a:tc>
+                  <a:txBody>
+                    <a:bodyPr/>
+                    <a:lstStyle/>
+                    <a:p>
+                      <a:endParaRPr lang="en-US" sz="1000" dirty="0"/>
+                    </a:p>
+                  </a:txBody>
+                  <a:tcPr/>
+                </a:tc>
+                <a:extLst>
+                  <a:ext uri="{0D108BD9-81ED-4DB2-BD59-A6C34878D82A}">
+                    <a16:rowId xmlns:a16="http://schemas.microsoft.com/office/drawing/2014/main" val="1393056981"/>
+                  </a:ext>
+                </a:extLst>
+              </a:tr>
+              <a:tr h="280219">
+                <a:tc>
+                  <a:txBody>
+                    <a:bodyPr/>
+                    <a:lstStyle/>
+                    <a:p>
+                      <a:endParaRPr lang="en-US" sz="1000" dirty="0"/>
+                    </a:p>
+                  </a:txBody>
+                  <a:tcPr/>
+                </a:tc>
+                <a:tc>
+                  <a:txBody>
+                    <a:bodyPr/>
+                    <a:lstStyle/>
+                    <a:p>
+                      <a:endParaRPr lang="en-US" sz="1000" dirty="0"/>
+                    </a:p>
+                  </a:txBody>
+                  <a:tcPr/>
+                </a:tc>
+                <a:tc>
+                  <a:txBody>
+                    <a:bodyPr/>
+                    <a:lstStyle/>
+                    <a:p>
+                      <a:endParaRPr lang="en-US" sz="1000" dirty="0"/>
+                    </a:p>
+                  </a:txBody>
+                  <a:tcPr/>
+                </a:tc>
+                <a:tc>
+                  <a:txBody>
+                    <a:bodyPr/>
+                    <a:lstStyle/>
+                    <a:p>
+                      <a:endParaRPr lang="en-US" sz="1000" dirty="0"/>
+                    </a:p>
+                  </a:txBody>
+                  <a:tcPr/>
+                </a:tc>
+                <a:tc>
+                  <a:txBody>
+                    <a:bodyPr/>
+                    <a:lstStyle/>
+                    <a:p>
+                      <a:endParaRPr lang="en-US" sz="1000" dirty="0"/>
+                    </a:p>
+                  </a:txBody>
+                  <a:tcPr/>
+                </a:tc>
+                <a:tc>
+                  <a:txBody>
+                    <a:bodyPr/>
+                    <a:lstStyle/>
+                    <a:p>
+                      <a:endParaRPr lang="en-US" sz="1000" dirty="0"/>
+                    </a:p>
+                  </a:txBody>
+                  <a:tcPr/>
+                </a:tc>
+                <a:tc>
+                  <a:txBody>
+                    <a:bodyPr/>
+                    <a:lstStyle/>
+                    <a:p>
+                      <a:endParaRPr lang="en-US" sz="1000" dirty="0"/>
+                    </a:p>
+                  </a:txBody>
+                  <a:tcPr/>
+                </a:tc>
+                <a:tc>
+                  <a:txBody>
+                    <a:bodyPr/>
+                    <a:lstStyle/>
+                    <a:p>
+                      <a:endParaRPr lang="en-US" sz="1000" dirty="0"/>
+                    </a:p>
+                  </a:txBody>
+                  <a:tcPr/>
+                </a:tc>
+                <a:tc>
+                  <a:txBody>
+                    <a:bodyPr/>
+                    <a:lstStyle/>
+                    <a:p>
+                      <a:endParaRPr lang="en-US" sz="1000" dirty="0"/>
+                    </a:p>
+                  </a:txBody>
+                  <a:tcPr/>
+                </a:tc>
+                <a:tc>
+                  <a:txBody>
+                    <a:bodyPr/>
+                    <a:lstStyle/>
+                    <a:p>
+                      <a:endParaRPr lang="en-US" sz="1000" dirty="0"/>
+                    </a:p>
+                  </a:txBody>
+                  <a:tcPr/>
+                </a:tc>
+                <a:tc>
+                  <a:txBody>
+                    <a:bodyPr/>
+                    <a:lstStyle/>
+                    <a:p>
+                      <a:endParaRPr lang="en-US" sz="1000" dirty="0"/>
+                    </a:p>
+                  </a:txBody>
+                  <a:tcPr/>
+                </a:tc>
+                <a:tc>
+                  <a:txBody>
+                    <a:bodyPr/>
+                    <a:lstStyle/>
+                    <a:p>
+                      <a:endParaRPr lang="en-US" sz="1000" dirty="0"/>
+                    </a:p>
+                  </a:txBody>
+                  <a:tcPr/>
+                </a:tc>
+                <a:tc>
+                  <a:txBody>
+                    <a:bodyPr/>
+                    <a:lstStyle/>
+                    <a:p>
+                      <a:endParaRPr lang="en-US" sz="1000" dirty="0"/>
+                    </a:p>
+                  </a:txBody>
+                  <a:tcPr/>
+                </a:tc>
+                <a:tc>
+                  <a:txBody>
+                    <a:bodyPr/>
+                    <a:lstStyle/>
+                    <a:p>
+                      <a:endParaRPr lang="en-US" sz="1000" dirty="0"/>
+                    </a:p>
+                  </a:txBody>
+                  <a:tcPr/>
+                </a:tc>
+                <a:tc>
+                  <a:txBody>
+                    <a:bodyPr/>
+                    <a:lstStyle/>
+                    <a:p>
+                      <a:endParaRPr lang="en-US" sz="1000" dirty="0"/>
+                    </a:p>
+                  </a:txBody>
+                  <a:tcPr/>
+                </a:tc>
+                <a:extLst>
+                  <a:ext uri="{0D108BD9-81ED-4DB2-BD59-A6C34878D82A}">
+                    <a16:rowId xmlns:a16="http://schemas.microsoft.com/office/drawing/2014/main" val="1607308505"/>
+                  </a:ext>
+                </a:extLst>
+              </a:tr>
+            </a:tbl>
+          </a:graphicData>
+        </a:graphic>
+      </p:graphicFrame>
+      <p:graphicFrame>
+        <p:nvGraphicFramePr>
+          <p:cNvPr id="6" name="Table 5">
+            <a:extLst>
+              <a:ext uri="{FF2B5EF4-FFF2-40B4-BE49-F238E27FC236}">
+                <a16:creationId xmlns:a16="http://schemas.microsoft.com/office/drawing/2014/main" id="{E5EB8595-1C97-9616-B9E2-1E3B5A63E636}"/>
+              </a:ext>
+            </a:extLst>
+          </p:cNvPr>
+          <p:cNvGraphicFramePr>
+            <a:graphicFrameLocks noGrp="1"/>
+          </p:cNvGraphicFramePr>
+          <p:nvPr>
+            <p:extLst>
+              <p:ext uri="{D42A27DB-BD31-4B8C-83A1-F6EECF244321}">
+                <p14:modId xmlns:p14="http://schemas.microsoft.com/office/powerpoint/2010/main" val="2054737908"/>
               </p:ext>
             </p:extLst>
           </p:nvPr>
@@ -18032,7 +20856,7 @@
           <p:cNvPr id="5" name="Title 4">
             <a:extLst>
               <a:ext uri="{FF2B5EF4-FFF2-40B4-BE49-F238E27FC236}">
-                <a16:creationId xmlns:a16="http://schemas.microsoft.com/office/drawing/2014/main" id="{E3EF99E4-5676-39DB-6F1E-CF2FA26DDBA5}"/>
+                <a16:creationId xmlns:a16="http://schemas.microsoft.com/office/drawing/2014/main" id="{5FDCD344-61AD-2FF5-4240-894DC1BED13D}"/>
               </a:ext>
             </a:extLst>
           </p:cNvPr>
@@ -18045,8 +20869,8 @@
         </p:nvSpPr>
         <p:spPr>
           <a:xfrm>
-            <a:off x="275302" y="147462"/>
-            <a:ext cx="2654711" cy="739409"/>
+            <a:off x="344128" y="78636"/>
+            <a:ext cx="1307691" cy="739409"/>
           </a:xfrm>
         </p:spPr>
         <p:txBody>
@@ -18055,18 +20879,15 @@
           </a:bodyPr>
           <a:lstStyle/>
           <a:p>
-            <a:pPr rtl="1"/>
-            <a:r>
-              <a:rPr lang="fa-IR" sz="4800" dirty="0">
+            <a:r>
+              <a:rPr lang="en-US" sz="4000" b="1" dirty="0"/>
+              <a:t>Split</a:t>
+            </a:r>
+            <a:r>
+              <a:rPr lang="en-US" sz="4000" dirty="0">
                 <a:cs typeface="B Yekan" panose="00000400000000000000" pitchFamily="2" charset="-78"/>
               </a:rPr>
-              <a:t>انتخاب</a:t>
-            </a:r>
-            <a:r>
-              <a:rPr lang="en-US" sz="4800" dirty="0">
-                <a:cs typeface="B Yekan" panose="00000400000000000000" pitchFamily="2" charset="-78"/>
-              </a:rPr>
-              <a:t>k </a:t>
+              <a:t> </a:t>
             </a:r>
           </a:p>
         </p:txBody>
@@ -18076,7 +20897,7 @@
           <p:cNvPr id="13" name="Straight Connector 12">
             <a:extLst>
               <a:ext uri="{FF2B5EF4-FFF2-40B4-BE49-F238E27FC236}">
-                <a16:creationId xmlns:a16="http://schemas.microsoft.com/office/drawing/2014/main" id="{8B33491F-3117-59D4-C77D-E7ABEAB78011}"/>
+                <a16:creationId xmlns:a16="http://schemas.microsoft.com/office/drawing/2014/main" id="{C124CA81-4F92-AE22-0AE8-2DC877FE7702}"/>
               </a:ext>
             </a:extLst>
           </p:cNvPr>
@@ -18112,10 +20933,65 @@
       </p:cxnSp>
       <p:sp>
         <p:nvSpPr>
-          <p:cNvPr id="21" name="TextBox 20">
+          <p:cNvPr id="2" name="Rectangle 1">
             <a:extLst>
               <a:ext uri="{FF2B5EF4-FFF2-40B4-BE49-F238E27FC236}">
-                <a16:creationId xmlns:a16="http://schemas.microsoft.com/office/drawing/2014/main" id="{6138D7A1-59C2-AC06-5FAF-CC6B350EDA2F}"/>
+                <a16:creationId xmlns:a16="http://schemas.microsoft.com/office/drawing/2014/main" id="{B47C18CE-F033-94E2-C1D0-4E606D21742E}"/>
+              </a:ext>
+            </a:extLst>
+          </p:cNvPr>
+          <p:cNvSpPr/>
+          <p:nvPr/>
+        </p:nvSpPr>
+        <p:spPr>
+          <a:xfrm>
+            <a:off x="7221799" y="1471653"/>
+            <a:ext cx="3588775" cy="3923071"/>
+          </a:xfrm>
+          <a:prstGeom prst="rect">
+            <a:avLst/>
+          </a:prstGeom>
+          <a:solidFill>
+            <a:schemeClr val="accent1">
+              <a:lumMod val="20000"/>
+              <a:lumOff val="80000"/>
+            </a:schemeClr>
+          </a:solidFill>
+          <a:ln>
+            <a:solidFill>
+              <a:schemeClr val="tx1"/>
+            </a:solidFill>
+          </a:ln>
+        </p:spPr>
+        <p:style>
+          <a:lnRef idx="2">
+            <a:schemeClr val="accent6"/>
+          </a:lnRef>
+          <a:fillRef idx="1">
+            <a:schemeClr val="lt1"/>
+          </a:fillRef>
+          <a:effectRef idx="0">
+            <a:schemeClr val="accent6"/>
+          </a:effectRef>
+          <a:fontRef idx="minor">
+            <a:schemeClr val="dk1"/>
+          </a:fontRef>
+        </p:style>
+        <p:txBody>
+          <a:bodyPr rtlCol="0" anchor="ctr"/>
+          <a:lstStyle/>
+          <a:p>
+            <a:pPr algn="ctr"/>
+            <a:endParaRPr lang="en-US" dirty="0"/>
+          </a:p>
+        </p:txBody>
+      </p:sp>
+      <p:sp>
+        <p:nvSpPr>
+          <p:cNvPr id="4" name="TextBox 3">
+            <a:extLst>
+              <a:ext uri="{FF2B5EF4-FFF2-40B4-BE49-F238E27FC236}">
+                <a16:creationId xmlns:a16="http://schemas.microsoft.com/office/drawing/2014/main" id="{2A08CAE1-F5C6-E8E7-548F-52B6ABBE794A}"/>
               </a:ext>
             </a:extLst>
           </p:cNvPr>
@@ -18124,8 +21000,8 @@
         </p:nvSpPr>
         <p:spPr>
           <a:xfrm>
-            <a:off x="634181" y="1789075"/>
-            <a:ext cx="10923638" cy="2823850"/>
+            <a:off x="1504335" y="1022555"/>
+            <a:ext cx="1671484" cy="369332"/>
           </a:xfrm>
           <a:prstGeom prst="rect">
             <a:avLst/>
@@ -18133,169 +21009,1306 @@
           <a:noFill/>
         </p:spPr>
         <p:txBody>
-          <a:bodyPr wrap="square">
+          <a:bodyPr wrap="square" rtlCol="0">
             <a:spAutoFit/>
           </a:bodyPr>
           <a:lstStyle/>
           <a:p>
-            <a:pPr algn="r" rtl="1">
-              <a:lnSpc>
-                <a:spcPct val="150000"/>
-              </a:lnSpc>
-            </a:pPr>
-            <a:r>
-              <a:rPr lang="en-US" sz="2000" dirty="0">
-                <a:cs typeface="B Yekan" panose="00000400000000000000" pitchFamily="2" charset="-78"/>
-              </a:rPr>
-              <a:t>k </a:t>
-            </a:r>
-            <a:r>
-              <a:rPr lang="fa-IR" sz="2000" dirty="0">
-                <a:cs typeface="B Yekan" panose="00000400000000000000" pitchFamily="2" charset="-78"/>
-              </a:rPr>
-              <a:t>کوچک → مدل به نویز حساس می‌شود، احتمال </a:t>
-            </a:r>
-            <a:r>
-              <a:rPr lang="en-US" sz="2000" dirty="0">
-                <a:cs typeface="B Yekan" panose="00000400000000000000" pitchFamily="2" charset="-78"/>
-              </a:rPr>
-              <a:t>overfitting </a:t>
-            </a:r>
-            <a:r>
-              <a:rPr lang="fa-IR" sz="2000" dirty="0">
-                <a:cs typeface="B Yekan" panose="00000400000000000000" pitchFamily="2" charset="-78"/>
-              </a:rPr>
-              <a:t>بالا</a:t>
+            <a:r>
+              <a:rPr lang="en-US" dirty="0"/>
+              <a:t>df : Data Frame</a:t>
             </a:r>
           </a:p>
+        </p:txBody>
+      </p:sp>
+      <p:sp>
+        <p:nvSpPr>
+          <p:cNvPr id="9" name="Rectangle 8">
+            <a:extLst>
+              <a:ext uri="{FF2B5EF4-FFF2-40B4-BE49-F238E27FC236}">
+                <a16:creationId xmlns:a16="http://schemas.microsoft.com/office/drawing/2014/main" id="{F9873A0F-753F-8597-1117-88ED43826985}"/>
+              </a:ext>
+            </a:extLst>
+          </p:cNvPr>
+          <p:cNvSpPr/>
+          <p:nvPr/>
+        </p:nvSpPr>
+        <p:spPr>
+          <a:xfrm>
+            <a:off x="10063322" y="1471653"/>
+            <a:ext cx="747251" cy="3923071"/>
+          </a:xfrm>
+          <a:prstGeom prst="rect">
+            <a:avLst/>
+          </a:prstGeom>
+          <a:solidFill>
+            <a:schemeClr val="accent1">
+              <a:lumMod val="20000"/>
+              <a:lumOff val="80000"/>
+            </a:schemeClr>
+          </a:solidFill>
+          <a:ln>
+            <a:solidFill>
+              <a:schemeClr val="tx1"/>
+            </a:solidFill>
+          </a:ln>
+        </p:spPr>
+        <p:style>
+          <a:lnRef idx="2">
+            <a:schemeClr val="accent6"/>
+          </a:lnRef>
+          <a:fillRef idx="1">
+            <a:schemeClr val="lt1"/>
+          </a:fillRef>
+          <a:effectRef idx="0">
+            <a:schemeClr val="accent6"/>
+          </a:effectRef>
+          <a:fontRef idx="minor">
+            <a:schemeClr val="dk1"/>
+          </a:fontRef>
+        </p:style>
+        <p:txBody>
+          <a:bodyPr rtlCol="0" anchor="ctr"/>
+          <a:lstStyle/>
           <a:p>
-            <a:pPr algn="r" rtl="1">
-              <a:lnSpc>
-                <a:spcPct val="150000"/>
-              </a:lnSpc>
-            </a:pPr>
-            <a:r>
-              <a:rPr lang="en-US" sz="2000" dirty="0">
-                <a:cs typeface="B Yekan" panose="00000400000000000000" pitchFamily="2" charset="-78"/>
-              </a:rPr>
-              <a:t>k </a:t>
-            </a:r>
-            <a:r>
-              <a:rPr lang="fa-IR" sz="2000" dirty="0">
-                <a:cs typeface="B Yekan" panose="00000400000000000000" pitchFamily="2" charset="-78"/>
-              </a:rPr>
-              <a:t>بزرگ → تصمیم‌گیری نرم‌تر اما احتمال </a:t>
-            </a:r>
-            <a:r>
-              <a:rPr lang="en-US" sz="2000" dirty="0">
-                <a:cs typeface="B Yekan" panose="00000400000000000000" pitchFamily="2" charset="-78"/>
-              </a:rPr>
-              <a:t>underfitting </a:t>
-            </a:r>
-            <a:r>
-              <a:rPr lang="fa-IR" sz="2000" dirty="0">
-                <a:cs typeface="B Yekan" panose="00000400000000000000" pitchFamily="2" charset="-78"/>
-              </a:rPr>
-              <a:t>و کاهش دقت روی جزئیات</a:t>
-            </a:r>
+            <a:pPr algn="ctr"/>
+            <a:endParaRPr lang="en-US" dirty="0"/>
           </a:p>
+        </p:txBody>
+      </p:sp>
+      <p:sp>
+        <p:nvSpPr>
+          <p:cNvPr id="10" name="Rectangle 9">
+            <a:extLst>
+              <a:ext uri="{FF2B5EF4-FFF2-40B4-BE49-F238E27FC236}">
+                <a16:creationId xmlns:a16="http://schemas.microsoft.com/office/drawing/2014/main" id="{41D79D59-3202-8E0D-A47F-EA18AB1A4120}"/>
+              </a:ext>
+            </a:extLst>
+          </p:cNvPr>
+          <p:cNvSpPr/>
+          <p:nvPr/>
+        </p:nvSpPr>
+        <p:spPr>
+          <a:xfrm>
+            <a:off x="7221793" y="4625350"/>
+            <a:ext cx="3588780" cy="769369"/>
+          </a:xfrm>
+          <a:prstGeom prst="rect">
+            <a:avLst/>
+          </a:prstGeom>
+          <a:noFill/>
+          <a:ln>
+            <a:solidFill>
+              <a:schemeClr val="tx1"/>
+            </a:solidFill>
+          </a:ln>
+        </p:spPr>
+        <p:style>
+          <a:lnRef idx="2">
+            <a:schemeClr val="accent6"/>
+          </a:lnRef>
+          <a:fillRef idx="1">
+            <a:schemeClr val="lt1"/>
+          </a:fillRef>
+          <a:effectRef idx="0">
+            <a:schemeClr val="accent6"/>
+          </a:effectRef>
+          <a:fontRef idx="minor">
+            <a:schemeClr val="dk1"/>
+          </a:fontRef>
+        </p:style>
+        <p:txBody>
+          <a:bodyPr rtlCol="0" anchor="ctr"/>
+          <a:lstStyle/>
           <a:p>
-            <a:pPr algn="r" rtl="1">
-              <a:lnSpc>
-                <a:spcPct val="150000"/>
-              </a:lnSpc>
-            </a:pPr>
-            <a:r>
-              <a:rPr lang="fa-IR" sz="2000" dirty="0">
-                <a:cs typeface="B Yekan" panose="00000400000000000000" pitchFamily="2" charset="-78"/>
-              </a:rPr>
-              <a:t>معمولاً انتخاب </a:t>
-            </a:r>
-            <a:r>
-              <a:rPr lang="en-US" sz="2000" dirty="0">
-                <a:cs typeface="B Yekan" panose="00000400000000000000" pitchFamily="2" charset="-78"/>
-              </a:rPr>
-              <a:t>k </a:t>
-            </a:r>
-            <a:r>
-              <a:rPr lang="fa-IR" sz="2000" dirty="0">
-                <a:cs typeface="B Yekan" panose="00000400000000000000" pitchFamily="2" charset="-78"/>
-              </a:rPr>
-              <a:t>با روش‌های </a:t>
-            </a:r>
-            <a:r>
-              <a:rPr lang="en-US" sz="2000" dirty="0">
-                <a:cs typeface="B Yekan" panose="00000400000000000000" pitchFamily="2" charset="-78"/>
-              </a:rPr>
-              <a:t>Cross-Validation </a:t>
-            </a:r>
-            <a:r>
-              <a:rPr lang="fa-IR" sz="2000" dirty="0">
-                <a:cs typeface="B Yekan" panose="00000400000000000000" pitchFamily="2" charset="-78"/>
-              </a:rPr>
-              <a:t>انجام می‌شود</a:t>
-            </a:r>
+            <a:pPr algn="ctr"/>
+            <a:endParaRPr lang="en-US" dirty="0"/>
           </a:p>
+        </p:txBody>
+      </p:sp>
+      <p:sp>
+        <p:nvSpPr>
+          <p:cNvPr id="11" name="Rectangle 10">
+            <a:extLst>
+              <a:ext uri="{FF2B5EF4-FFF2-40B4-BE49-F238E27FC236}">
+                <a16:creationId xmlns:a16="http://schemas.microsoft.com/office/drawing/2014/main" id="{98DD404E-2BE8-3BF9-79A7-D0EC979DC465}"/>
+              </a:ext>
+            </a:extLst>
+          </p:cNvPr>
+          <p:cNvSpPr/>
+          <p:nvPr/>
+        </p:nvSpPr>
+        <p:spPr>
+          <a:xfrm>
+            <a:off x="7221793" y="3855976"/>
+            <a:ext cx="3588780" cy="769369"/>
+          </a:xfrm>
+          <a:prstGeom prst="rect">
+            <a:avLst/>
+          </a:prstGeom>
+          <a:solidFill>
+            <a:schemeClr val="accent1">
+              <a:lumMod val="40000"/>
+              <a:lumOff val="60000"/>
+            </a:schemeClr>
+          </a:solidFill>
+          <a:ln>
+            <a:solidFill>
+              <a:schemeClr val="tx1"/>
+            </a:solidFill>
+          </a:ln>
+        </p:spPr>
+        <p:style>
+          <a:lnRef idx="2">
+            <a:schemeClr val="accent6"/>
+          </a:lnRef>
+          <a:fillRef idx="1">
+            <a:schemeClr val="lt1"/>
+          </a:fillRef>
+          <a:effectRef idx="0">
+            <a:schemeClr val="accent6"/>
+          </a:effectRef>
+          <a:fontRef idx="minor">
+            <a:schemeClr val="dk1"/>
+          </a:fontRef>
+        </p:style>
+        <p:txBody>
+          <a:bodyPr rtlCol="0" anchor="ctr"/>
+          <a:lstStyle/>
           <a:p>
-            <a:pPr algn="r" rtl="1">
-              <a:lnSpc>
-                <a:spcPct val="150000"/>
-              </a:lnSpc>
-            </a:pPr>
-            <a:r>
-              <a:rPr lang="fa-IR" sz="2000" dirty="0">
-                <a:cs typeface="B Yekan" panose="00000400000000000000" pitchFamily="2" charset="-78"/>
-              </a:rPr>
-              <a:t>مقدار </a:t>
-            </a:r>
-            <a:r>
-              <a:rPr lang="en-US" sz="2000" dirty="0">
-                <a:cs typeface="B Yekan" panose="00000400000000000000" pitchFamily="2" charset="-78"/>
-              </a:rPr>
-              <a:t>k </a:t>
-            </a:r>
-            <a:r>
-              <a:rPr lang="fa-IR" sz="2000" dirty="0">
-                <a:cs typeface="B Yekan" panose="00000400000000000000" pitchFamily="2" charset="-78"/>
-              </a:rPr>
-              <a:t>اغلب عددی فرد (برای جلوگیری از تساوی در رأی‌گیری) انتخاب می‌شود</a:t>
-            </a:r>
+            <a:pPr algn="ctr"/>
+            <a:endParaRPr lang="en-US" dirty="0"/>
           </a:p>
+        </p:txBody>
+      </p:sp>
+      <p:sp>
+        <p:nvSpPr>
+          <p:cNvPr id="12" name="Left Brace 11">
+            <a:extLst>
+              <a:ext uri="{FF2B5EF4-FFF2-40B4-BE49-F238E27FC236}">
+                <a16:creationId xmlns:a16="http://schemas.microsoft.com/office/drawing/2014/main" id="{063D052F-0BE8-FBD2-CE9B-C92CF3484A4C}"/>
+              </a:ext>
+            </a:extLst>
+          </p:cNvPr>
+          <p:cNvSpPr/>
+          <p:nvPr/>
+        </p:nvSpPr>
+        <p:spPr>
+          <a:xfrm>
+            <a:off x="6936664" y="1461821"/>
+            <a:ext cx="157316" cy="3153692"/>
+          </a:xfrm>
+          <a:prstGeom prst="leftBrace">
+            <a:avLst/>
+          </a:prstGeom>
+        </p:spPr>
+        <p:style>
+          <a:lnRef idx="1">
+            <a:schemeClr val="accent1"/>
+          </a:lnRef>
+          <a:fillRef idx="0">
+            <a:schemeClr val="accent1"/>
+          </a:fillRef>
+          <a:effectRef idx="0">
+            <a:schemeClr val="accent1"/>
+          </a:effectRef>
+          <a:fontRef idx="minor">
+            <a:schemeClr val="tx1"/>
+          </a:fontRef>
+        </p:style>
+        <p:txBody>
+          <a:bodyPr rtlCol="0" anchor="ctr"/>
+          <a:lstStyle/>
           <a:p>
-            <a:pPr algn="r" rtl="1">
-              <a:lnSpc>
-                <a:spcPct val="150000"/>
-              </a:lnSpc>
-            </a:pPr>
-            <a:r>
-              <a:rPr lang="fa-IR" sz="2000" dirty="0">
-                <a:cs typeface="B Yekan" panose="00000400000000000000" pitchFamily="2" charset="-78"/>
-              </a:rPr>
-              <a:t>انتخاب </a:t>
-            </a:r>
-            <a:r>
-              <a:rPr lang="en-US" sz="2000" dirty="0">
-                <a:cs typeface="B Yekan" panose="00000400000000000000" pitchFamily="2" charset="-78"/>
-              </a:rPr>
-              <a:t>k </a:t>
-            </a:r>
-            <a:r>
-              <a:rPr lang="fa-IR" sz="2000" dirty="0">
-                <a:cs typeface="B Yekan" panose="00000400000000000000" pitchFamily="2" charset="-78"/>
-              </a:rPr>
-              <a:t>وابسته به تراکم و اندازه ی داده است؛ با افزایش داده ی آموزشی، معمولاً </a:t>
-            </a:r>
-            <a:r>
-              <a:rPr lang="en-US" sz="2000" dirty="0">
-                <a:cs typeface="B Yekan" panose="00000400000000000000" pitchFamily="2" charset="-78"/>
-              </a:rPr>
-              <a:t>k </a:t>
-            </a:r>
-            <a:r>
-              <a:rPr lang="fa-IR" sz="2000" dirty="0">
-                <a:cs typeface="B Yekan" panose="00000400000000000000" pitchFamily="2" charset="-78"/>
-              </a:rPr>
-              <a:t>هم کمی بزرگ‌تر انتخاب می‌شود</a:t>
+            <a:pPr algn="ctr"/>
+            <a:endParaRPr lang="en-US" dirty="0"/>
+          </a:p>
+        </p:txBody>
+      </p:sp>
+      <p:sp>
+        <p:nvSpPr>
+          <p:cNvPr id="14" name="Left Brace 13">
+            <a:extLst>
+              <a:ext uri="{FF2B5EF4-FFF2-40B4-BE49-F238E27FC236}">
+                <a16:creationId xmlns:a16="http://schemas.microsoft.com/office/drawing/2014/main" id="{7DC4DF8A-A98F-9C97-3849-06F01707C061}"/>
+              </a:ext>
+            </a:extLst>
+          </p:cNvPr>
+          <p:cNvSpPr/>
+          <p:nvPr/>
+        </p:nvSpPr>
+        <p:spPr>
+          <a:xfrm>
+            <a:off x="6936664" y="4659764"/>
+            <a:ext cx="157316" cy="731520"/>
+          </a:xfrm>
+          <a:prstGeom prst="leftBrace">
+            <a:avLst/>
+          </a:prstGeom>
+        </p:spPr>
+        <p:style>
+          <a:lnRef idx="1">
+            <a:schemeClr val="accent1"/>
+          </a:lnRef>
+          <a:fillRef idx="0">
+            <a:schemeClr val="accent1"/>
+          </a:fillRef>
+          <a:effectRef idx="0">
+            <a:schemeClr val="accent1"/>
+          </a:effectRef>
+          <a:fontRef idx="minor">
+            <a:schemeClr val="tx1"/>
+          </a:fontRef>
+        </p:style>
+        <p:txBody>
+          <a:bodyPr rtlCol="0" anchor="ctr"/>
+          <a:lstStyle/>
+          <a:p>
+            <a:pPr algn="ctr"/>
+            <a:endParaRPr lang="en-US" dirty="0"/>
+          </a:p>
+        </p:txBody>
+      </p:sp>
+      <p:sp>
+        <p:nvSpPr>
+          <p:cNvPr id="15" name="Left Brace 14">
+            <a:extLst>
+              <a:ext uri="{FF2B5EF4-FFF2-40B4-BE49-F238E27FC236}">
+                <a16:creationId xmlns:a16="http://schemas.microsoft.com/office/drawing/2014/main" id="{0EE38351-FD89-0088-C656-3B24A9CE00D1}"/>
+              </a:ext>
+            </a:extLst>
+          </p:cNvPr>
+          <p:cNvSpPr/>
+          <p:nvPr/>
+        </p:nvSpPr>
+        <p:spPr>
+          <a:xfrm rot="5400000">
+            <a:off x="10358289" y="915060"/>
+            <a:ext cx="157316" cy="731520"/>
+          </a:xfrm>
+          <a:prstGeom prst="leftBrace">
+            <a:avLst/>
+          </a:prstGeom>
+        </p:spPr>
+        <p:style>
+          <a:lnRef idx="1">
+            <a:schemeClr val="accent1"/>
+          </a:lnRef>
+          <a:fillRef idx="0">
+            <a:schemeClr val="accent1"/>
+          </a:fillRef>
+          <a:effectRef idx="0">
+            <a:schemeClr val="accent1"/>
+          </a:effectRef>
+          <a:fontRef idx="minor">
+            <a:schemeClr val="tx1"/>
+          </a:fontRef>
+        </p:style>
+        <p:txBody>
+          <a:bodyPr rtlCol="0" anchor="ctr"/>
+          <a:lstStyle/>
+          <a:p>
+            <a:pPr algn="ctr"/>
+            <a:endParaRPr lang="en-US" dirty="0"/>
+          </a:p>
+        </p:txBody>
+      </p:sp>
+      <p:sp>
+        <p:nvSpPr>
+          <p:cNvPr id="16" name="Left Brace 15">
+            <a:extLst>
+              <a:ext uri="{FF2B5EF4-FFF2-40B4-BE49-F238E27FC236}">
+                <a16:creationId xmlns:a16="http://schemas.microsoft.com/office/drawing/2014/main" id="{E3DD6CC3-02AA-01FA-6DD5-02B158DEF7DF}"/>
+              </a:ext>
+            </a:extLst>
+          </p:cNvPr>
+          <p:cNvSpPr/>
+          <p:nvPr/>
+        </p:nvSpPr>
+        <p:spPr>
+          <a:xfrm rot="5400000">
+            <a:off x="8535383" y="-136500"/>
+            <a:ext cx="157316" cy="2834640"/>
+          </a:xfrm>
+          <a:prstGeom prst="leftBrace">
+            <a:avLst/>
+          </a:prstGeom>
+        </p:spPr>
+        <p:style>
+          <a:lnRef idx="1">
+            <a:schemeClr val="accent1"/>
+          </a:lnRef>
+          <a:fillRef idx="0">
+            <a:schemeClr val="accent1"/>
+          </a:fillRef>
+          <a:effectRef idx="0">
+            <a:schemeClr val="accent1"/>
+          </a:effectRef>
+          <a:fontRef idx="minor">
+            <a:schemeClr val="tx1"/>
+          </a:fontRef>
+        </p:style>
+        <p:txBody>
+          <a:bodyPr rtlCol="0" anchor="ctr"/>
+          <a:lstStyle/>
+          <a:p>
+            <a:pPr algn="ctr"/>
+            <a:endParaRPr lang="en-US" dirty="0"/>
+          </a:p>
+        </p:txBody>
+      </p:sp>
+      <p:sp>
+        <p:nvSpPr>
+          <p:cNvPr id="17" name="Left Brace 16">
+            <a:extLst>
+              <a:ext uri="{FF2B5EF4-FFF2-40B4-BE49-F238E27FC236}">
+                <a16:creationId xmlns:a16="http://schemas.microsoft.com/office/drawing/2014/main" id="{AA73B273-D38A-AAE7-58CC-190F90584C20}"/>
+              </a:ext>
+            </a:extLst>
+          </p:cNvPr>
+          <p:cNvSpPr/>
+          <p:nvPr/>
+        </p:nvSpPr>
+        <p:spPr>
+          <a:xfrm flipH="1">
+            <a:off x="10899057" y="3874900"/>
+            <a:ext cx="157316" cy="731520"/>
+          </a:xfrm>
+          <a:prstGeom prst="leftBrace">
+            <a:avLst/>
+          </a:prstGeom>
+        </p:spPr>
+        <p:style>
+          <a:lnRef idx="1">
+            <a:schemeClr val="accent1"/>
+          </a:lnRef>
+          <a:fillRef idx="0">
+            <a:schemeClr val="accent1"/>
+          </a:fillRef>
+          <a:effectRef idx="0">
+            <a:schemeClr val="accent1"/>
+          </a:effectRef>
+          <a:fontRef idx="minor">
+            <a:schemeClr val="tx1"/>
+          </a:fontRef>
+        </p:style>
+        <p:txBody>
+          <a:bodyPr rtlCol="0" anchor="ctr"/>
+          <a:lstStyle/>
+          <a:p>
+            <a:pPr algn="ctr"/>
+            <a:endParaRPr lang="en-US" dirty="0"/>
+          </a:p>
+        </p:txBody>
+      </p:sp>
+      <p:sp>
+        <p:nvSpPr>
+          <p:cNvPr id="18" name="Rectangle 17">
+            <a:extLst>
+              <a:ext uri="{FF2B5EF4-FFF2-40B4-BE49-F238E27FC236}">
+                <a16:creationId xmlns:a16="http://schemas.microsoft.com/office/drawing/2014/main" id="{74ACA17A-400D-5AF0-D0AE-6D9B3E3E8BB4}"/>
+              </a:ext>
+            </a:extLst>
+          </p:cNvPr>
+          <p:cNvSpPr/>
+          <p:nvPr/>
+        </p:nvSpPr>
+        <p:spPr>
+          <a:xfrm>
+            <a:off x="10063322" y="3855976"/>
+            <a:ext cx="747251" cy="769369"/>
+          </a:xfrm>
+          <a:prstGeom prst="rect">
+            <a:avLst/>
+          </a:prstGeom>
+          <a:solidFill>
+            <a:schemeClr val="accent1">
+              <a:lumMod val="40000"/>
+              <a:lumOff val="60000"/>
+            </a:schemeClr>
+          </a:solidFill>
+          <a:ln>
+            <a:solidFill>
+              <a:schemeClr val="tx1"/>
+            </a:solidFill>
+          </a:ln>
+        </p:spPr>
+        <p:style>
+          <a:lnRef idx="2">
+            <a:schemeClr val="accent6"/>
+          </a:lnRef>
+          <a:fillRef idx="1">
+            <a:schemeClr val="lt1"/>
+          </a:fillRef>
+          <a:effectRef idx="0">
+            <a:schemeClr val="accent6"/>
+          </a:effectRef>
+          <a:fontRef idx="minor">
+            <a:schemeClr val="dk1"/>
+          </a:fontRef>
+        </p:style>
+        <p:txBody>
+          <a:bodyPr rtlCol="0" anchor="ctr"/>
+          <a:lstStyle/>
+          <a:p>
+            <a:pPr algn="ctr"/>
+            <a:endParaRPr lang="en-US" dirty="0"/>
+          </a:p>
+        </p:txBody>
+      </p:sp>
+      <p:sp>
+        <p:nvSpPr>
+          <p:cNvPr id="19" name="Rectangle 18">
+            <a:extLst>
+              <a:ext uri="{FF2B5EF4-FFF2-40B4-BE49-F238E27FC236}">
+                <a16:creationId xmlns:a16="http://schemas.microsoft.com/office/drawing/2014/main" id="{96594BB4-406C-E71B-AD94-F168B47E16E4}"/>
+              </a:ext>
+            </a:extLst>
+          </p:cNvPr>
+          <p:cNvSpPr/>
+          <p:nvPr/>
+        </p:nvSpPr>
+        <p:spPr>
+          <a:xfrm>
+            <a:off x="7221793" y="4625352"/>
+            <a:ext cx="3588780" cy="769369"/>
+          </a:xfrm>
+          <a:prstGeom prst="rect">
+            <a:avLst/>
+          </a:prstGeom>
+          <a:solidFill>
+            <a:schemeClr val="accent2">
+              <a:lumMod val="40000"/>
+              <a:lumOff val="60000"/>
+            </a:schemeClr>
+          </a:solidFill>
+          <a:ln>
+            <a:solidFill>
+              <a:schemeClr val="tx1"/>
+            </a:solidFill>
+          </a:ln>
+        </p:spPr>
+        <p:style>
+          <a:lnRef idx="2">
+            <a:schemeClr val="accent6"/>
+          </a:lnRef>
+          <a:fillRef idx="1">
+            <a:schemeClr val="lt1"/>
+          </a:fillRef>
+          <a:effectRef idx="0">
+            <a:schemeClr val="accent6"/>
+          </a:effectRef>
+          <a:fontRef idx="minor">
+            <a:schemeClr val="dk1"/>
+          </a:fontRef>
+        </p:style>
+        <p:txBody>
+          <a:bodyPr rtlCol="0" anchor="ctr"/>
+          <a:lstStyle/>
+          <a:p>
+            <a:pPr algn="ctr"/>
+            <a:endParaRPr lang="en-US" dirty="0"/>
+          </a:p>
+        </p:txBody>
+      </p:sp>
+      <p:sp>
+        <p:nvSpPr>
+          <p:cNvPr id="20" name="Rectangle 19">
+            <a:extLst>
+              <a:ext uri="{FF2B5EF4-FFF2-40B4-BE49-F238E27FC236}">
+                <a16:creationId xmlns:a16="http://schemas.microsoft.com/office/drawing/2014/main" id="{68A26E76-8490-C2DB-52D4-73D7A06BF9E9}"/>
+              </a:ext>
+            </a:extLst>
+          </p:cNvPr>
+          <p:cNvSpPr/>
+          <p:nvPr/>
+        </p:nvSpPr>
+        <p:spPr>
+          <a:xfrm>
+            <a:off x="10063322" y="4625352"/>
+            <a:ext cx="747251" cy="769369"/>
+          </a:xfrm>
+          <a:prstGeom prst="rect">
+            <a:avLst/>
+          </a:prstGeom>
+          <a:solidFill>
+            <a:schemeClr val="accent2">
+              <a:lumMod val="40000"/>
+              <a:lumOff val="60000"/>
+            </a:schemeClr>
+          </a:solidFill>
+          <a:ln>
+            <a:solidFill>
+              <a:schemeClr val="tx1"/>
+            </a:solidFill>
+          </a:ln>
+        </p:spPr>
+        <p:style>
+          <a:lnRef idx="2">
+            <a:schemeClr val="accent6"/>
+          </a:lnRef>
+          <a:fillRef idx="1">
+            <a:schemeClr val="lt1"/>
+          </a:fillRef>
+          <a:effectRef idx="0">
+            <a:schemeClr val="accent6"/>
+          </a:effectRef>
+          <a:fontRef idx="minor">
+            <a:schemeClr val="dk1"/>
+          </a:fontRef>
+        </p:style>
+        <p:txBody>
+          <a:bodyPr rtlCol="0" anchor="ctr"/>
+          <a:lstStyle/>
+          <a:p>
+            <a:pPr algn="ctr"/>
+            <a:endParaRPr lang="en-US" dirty="0"/>
+          </a:p>
+        </p:txBody>
+      </p:sp>
+      <p:sp>
+        <p:nvSpPr>
+          <p:cNvPr id="21" name="TextBox 20">
+            <a:extLst>
+              <a:ext uri="{FF2B5EF4-FFF2-40B4-BE49-F238E27FC236}">
+                <a16:creationId xmlns:a16="http://schemas.microsoft.com/office/drawing/2014/main" id="{659EA85B-DE9B-AE9E-9ECD-11CF05271C21}"/>
+              </a:ext>
+            </a:extLst>
+          </p:cNvPr>
+          <p:cNvSpPr txBox="1"/>
+          <p:nvPr/>
+        </p:nvSpPr>
+        <p:spPr>
+          <a:xfrm>
+            <a:off x="5855517" y="2854001"/>
+            <a:ext cx="1159805" cy="369332"/>
+          </a:xfrm>
+          <a:prstGeom prst="rect">
+            <a:avLst/>
+          </a:prstGeom>
+          <a:noFill/>
+        </p:spPr>
+        <p:txBody>
+          <a:bodyPr wrap="square" rtlCol="0">
+            <a:spAutoFit/>
+          </a:bodyPr>
+          <a:lstStyle/>
+          <a:p>
+            <a:pPr algn="ctr"/>
+            <a:r>
+              <a:rPr lang="en-US" dirty="0"/>
+              <a:t>Train_Val</a:t>
+            </a:r>
+          </a:p>
+        </p:txBody>
+      </p:sp>
+      <p:sp>
+        <p:nvSpPr>
+          <p:cNvPr id="22" name="TextBox 21">
+            <a:extLst>
+              <a:ext uri="{FF2B5EF4-FFF2-40B4-BE49-F238E27FC236}">
+                <a16:creationId xmlns:a16="http://schemas.microsoft.com/office/drawing/2014/main" id="{0D61E68C-77F2-7E6E-9852-B4E9A1D9C013}"/>
+              </a:ext>
+            </a:extLst>
+          </p:cNvPr>
+          <p:cNvSpPr txBox="1"/>
+          <p:nvPr/>
+        </p:nvSpPr>
+        <p:spPr>
+          <a:xfrm>
+            <a:off x="6250212" y="4825368"/>
+            <a:ext cx="765110" cy="369332"/>
+          </a:xfrm>
+          <a:prstGeom prst="rect">
+            <a:avLst/>
+          </a:prstGeom>
+          <a:noFill/>
+        </p:spPr>
+        <p:txBody>
+          <a:bodyPr wrap="square" rtlCol="0">
+            <a:spAutoFit/>
+          </a:bodyPr>
+          <a:lstStyle/>
+          <a:p>
+            <a:pPr algn="ctr"/>
+            <a:r>
+              <a:rPr lang="en-US" dirty="0"/>
+              <a:t>Test</a:t>
+            </a:r>
+          </a:p>
+        </p:txBody>
+      </p:sp>
+      <p:sp>
+        <p:nvSpPr>
+          <p:cNvPr id="23" name="TextBox 22">
+            <a:extLst>
+              <a:ext uri="{FF2B5EF4-FFF2-40B4-BE49-F238E27FC236}">
+                <a16:creationId xmlns:a16="http://schemas.microsoft.com/office/drawing/2014/main" id="{6C9FFF9A-9C88-D069-16C0-833EEC7E1FA0}"/>
+              </a:ext>
+            </a:extLst>
+          </p:cNvPr>
+          <p:cNvSpPr txBox="1"/>
+          <p:nvPr/>
+        </p:nvSpPr>
+        <p:spPr>
+          <a:xfrm>
+            <a:off x="10938386" y="4055994"/>
+            <a:ext cx="1229139" cy="369332"/>
+          </a:xfrm>
+          <a:prstGeom prst="rect">
+            <a:avLst/>
+          </a:prstGeom>
+          <a:noFill/>
+        </p:spPr>
+        <p:txBody>
+          <a:bodyPr wrap="square" rtlCol="0">
+            <a:spAutoFit/>
+          </a:bodyPr>
+          <a:lstStyle/>
+          <a:p>
+            <a:pPr algn="ctr"/>
+            <a:r>
+              <a:rPr lang="en-US" dirty="0"/>
+              <a:t>Validation</a:t>
+            </a:r>
+          </a:p>
+        </p:txBody>
+      </p:sp>
+      <p:sp>
+        <p:nvSpPr>
+          <p:cNvPr id="24" name="TextBox 23">
+            <a:extLst>
+              <a:ext uri="{FF2B5EF4-FFF2-40B4-BE49-F238E27FC236}">
+                <a16:creationId xmlns:a16="http://schemas.microsoft.com/office/drawing/2014/main" id="{C911D8D4-10B5-D66F-0F44-A66A86132BDD}"/>
+              </a:ext>
+            </a:extLst>
+          </p:cNvPr>
+          <p:cNvSpPr txBox="1"/>
+          <p:nvPr/>
+        </p:nvSpPr>
+        <p:spPr>
+          <a:xfrm>
+            <a:off x="10054392" y="867850"/>
+            <a:ext cx="765110" cy="369332"/>
+          </a:xfrm>
+          <a:prstGeom prst="rect">
+            <a:avLst/>
+          </a:prstGeom>
+          <a:noFill/>
+        </p:spPr>
+        <p:txBody>
+          <a:bodyPr wrap="square" rtlCol="0">
+            <a:spAutoFit/>
+          </a:bodyPr>
+          <a:lstStyle/>
+          <a:p>
+            <a:pPr algn="ctr"/>
+            <a:r>
+              <a:rPr lang="en-US" dirty="0"/>
+              <a:t>Y</a:t>
+            </a:r>
+          </a:p>
+        </p:txBody>
+      </p:sp>
+      <p:sp>
+        <p:nvSpPr>
+          <p:cNvPr id="25" name="TextBox 24">
+            <a:extLst>
+              <a:ext uri="{FF2B5EF4-FFF2-40B4-BE49-F238E27FC236}">
+                <a16:creationId xmlns:a16="http://schemas.microsoft.com/office/drawing/2014/main" id="{9BFC43DD-DC6B-0938-6A46-D0855BCF5131}"/>
+              </a:ext>
+            </a:extLst>
+          </p:cNvPr>
+          <p:cNvSpPr txBox="1"/>
+          <p:nvPr/>
+        </p:nvSpPr>
+        <p:spPr>
+          <a:xfrm>
+            <a:off x="8231486" y="832825"/>
+            <a:ext cx="765110" cy="369332"/>
+          </a:xfrm>
+          <a:prstGeom prst="rect">
+            <a:avLst/>
+          </a:prstGeom>
+          <a:noFill/>
+        </p:spPr>
+        <p:txBody>
+          <a:bodyPr wrap="square" rtlCol="0">
+            <a:spAutoFit/>
+          </a:bodyPr>
+          <a:lstStyle/>
+          <a:p>
+            <a:pPr algn="ctr"/>
+            <a:r>
+              <a:rPr lang="en-US" dirty="0"/>
+              <a:t>X</a:t>
+            </a:r>
+          </a:p>
+        </p:txBody>
+      </p:sp>
+      <p:sp>
+        <p:nvSpPr>
+          <p:cNvPr id="26" name="TextBox 25">
+            <a:extLst>
+              <a:ext uri="{FF2B5EF4-FFF2-40B4-BE49-F238E27FC236}">
+                <a16:creationId xmlns:a16="http://schemas.microsoft.com/office/drawing/2014/main" id="{A2D03ADB-4675-467F-AF25-69207AF41A14}"/>
+              </a:ext>
+            </a:extLst>
+          </p:cNvPr>
+          <p:cNvSpPr txBox="1"/>
+          <p:nvPr/>
+        </p:nvSpPr>
+        <p:spPr>
+          <a:xfrm>
+            <a:off x="6250212" y="5072118"/>
+            <a:ext cx="765110" cy="261610"/>
+          </a:xfrm>
+          <a:prstGeom prst="rect">
+            <a:avLst/>
+          </a:prstGeom>
+          <a:noFill/>
+        </p:spPr>
+        <p:txBody>
+          <a:bodyPr wrap="square" rtlCol="0">
+            <a:spAutoFit/>
+          </a:bodyPr>
+          <a:lstStyle/>
+          <a:p>
+            <a:pPr algn="ctr"/>
+            <a:r>
+              <a:rPr lang="en-US" sz="1050" dirty="0"/>
+              <a:t>20%</a:t>
+            </a:r>
+          </a:p>
+        </p:txBody>
+      </p:sp>
+      <p:sp>
+        <p:nvSpPr>
+          <p:cNvPr id="27" name="TextBox 26">
+            <a:extLst>
+              <a:ext uri="{FF2B5EF4-FFF2-40B4-BE49-F238E27FC236}">
+                <a16:creationId xmlns:a16="http://schemas.microsoft.com/office/drawing/2014/main" id="{23BA2709-E99A-3C30-03BE-5C792425E42C}"/>
+              </a:ext>
+            </a:extLst>
+          </p:cNvPr>
+          <p:cNvSpPr txBox="1"/>
+          <p:nvPr/>
+        </p:nvSpPr>
+        <p:spPr>
+          <a:xfrm>
+            <a:off x="10938386" y="2465875"/>
+            <a:ext cx="765110" cy="369332"/>
+          </a:xfrm>
+          <a:prstGeom prst="rect">
+            <a:avLst/>
+          </a:prstGeom>
+          <a:noFill/>
+        </p:spPr>
+        <p:txBody>
+          <a:bodyPr wrap="square" rtlCol="0">
+            <a:spAutoFit/>
+          </a:bodyPr>
+          <a:lstStyle/>
+          <a:p>
+            <a:pPr algn="ctr"/>
+            <a:r>
+              <a:rPr lang="en-US" dirty="0"/>
+              <a:t>Train</a:t>
+            </a:r>
+          </a:p>
+        </p:txBody>
+      </p:sp>
+      <p:sp>
+        <p:nvSpPr>
+          <p:cNvPr id="28" name="Left Brace 27">
+            <a:extLst>
+              <a:ext uri="{FF2B5EF4-FFF2-40B4-BE49-F238E27FC236}">
+                <a16:creationId xmlns:a16="http://schemas.microsoft.com/office/drawing/2014/main" id="{776FA044-5009-34F8-E8B6-6B56B694A188}"/>
+              </a:ext>
+            </a:extLst>
+          </p:cNvPr>
+          <p:cNvSpPr/>
+          <p:nvPr/>
+        </p:nvSpPr>
+        <p:spPr>
+          <a:xfrm flipH="1">
+            <a:off x="10899057" y="1461821"/>
+            <a:ext cx="157316" cy="2377440"/>
+          </a:xfrm>
+          <a:prstGeom prst="leftBrace">
+            <a:avLst/>
+          </a:prstGeom>
+        </p:spPr>
+        <p:style>
+          <a:lnRef idx="1">
+            <a:schemeClr val="accent1"/>
+          </a:lnRef>
+          <a:fillRef idx="0">
+            <a:schemeClr val="accent1"/>
+          </a:fillRef>
+          <a:effectRef idx="0">
+            <a:schemeClr val="accent1"/>
+          </a:effectRef>
+          <a:fontRef idx="minor">
+            <a:schemeClr val="tx1"/>
+          </a:fontRef>
+        </p:style>
+        <p:txBody>
+          <a:bodyPr rtlCol="0" anchor="ctr"/>
+          <a:lstStyle/>
+          <a:p>
+            <a:pPr algn="ctr"/>
+            <a:endParaRPr lang="en-US" dirty="0"/>
+          </a:p>
+        </p:txBody>
+      </p:sp>
+      <p:sp>
+        <p:nvSpPr>
+          <p:cNvPr id="29" name="TextBox 28">
+            <a:extLst>
+              <a:ext uri="{FF2B5EF4-FFF2-40B4-BE49-F238E27FC236}">
+                <a16:creationId xmlns:a16="http://schemas.microsoft.com/office/drawing/2014/main" id="{4C1A68FE-43E5-0CCE-6BE1-31E36732D5CF}"/>
+              </a:ext>
+            </a:extLst>
+          </p:cNvPr>
+          <p:cNvSpPr txBox="1"/>
+          <p:nvPr/>
+        </p:nvSpPr>
+        <p:spPr>
+          <a:xfrm>
+            <a:off x="11144856" y="4294521"/>
+            <a:ext cx="765110" cy="261610"/>
+          </a:xfrm>
+          <a:prstGeom prst="rect">
+            <a:avLst/>
+          </a:prstGeom>
+          <a:noFill/>
+        </p:spPr>
+        <p:txBody>
+          <a:bodyPr wrap="square" rtlCol="0">
+            <a:spAutoFit/>
+          </a:bodyPr>
+          <a:lstStyle/>
+          <a:p>
+            <a:pPr algn="ctr"/>
+            <a:r>
+              <a:rPr lang="en-US" sz="1050" dirty="0"/>
+              <a:t>20%</a:t>
+            </a:r>
+          </a:p>
+        </p:txBody>
+      </p:sp>
+      <p:sp>
+        <p:nvSpPr>
+          <p:cNvPr id="30" name="TextBox 29">
+            <a:extLst>
+              <a:ext uri="{FF2B5EF4-FFF2-40B4-BE49-F238E27FC236}">
+                <a16:creationId xmlns:a16="http://schemas.microsoft.com/office/drawing/2014/main" id="{E75B8632-9383-002D-B491-259FC178ED20}"/>
+              </a:ext>
+            </a:extLst>
+          </p:cNvPr>
+          <p:cNvSpPr txBox="1"/>
+          <p:nvPr/>
+        </p:nvSpPr>
+        <p:spPr>
+          <a:xfrm>
+            <a:off x="6046545" y="3123324"/>
+            <a:ext cx="765110" cy="261610"/>
+          </a:xfrm>
+          <a:prstGeom prst="rect">
+            <a:avLst/>
+          </a:prstGeom>
+          <a:noFill/>
+        </p:spPr>
+        <p:txBody>
+          <a:bodyPr wrap="square" rtlCol="0">
+            <a:spAutoFit/>
+          </a:bodyPr>
+          <a:lstStyle/>
+          <a:p>
+            <a:pPr algn="ctr"/>
+            <a:r>
+              <a:rPr lang="en-US" sz="1050" dirty="0"/>
+              <a:t>80%</a:t>
+            </a:r>
+          </a:p>
+        </p:txBody>
+      </p:sp>
+      <p:sp>
+        <p:nvSpPr>
+          <p:cNvPr id="31" name="TextBox 30">
+            <a:extLst>
+              <a:ext uri="{FF2B5EF4-FFF2-40B4-BE49-F238E27FC236}">
+                <a16:creationId xmlns:a16="http://schemas.microsoft.com/office/drawing/2014/main" id="{F0BE983B-EE56-A6A1-E60E-EE008753E715}"/>
+              </a:ext>
+            </a:extLst>
+          </p:cNvPr>
+          <p:cNvSpPr txBox="1"/>
+          <p:nvPr/>
+        </p:nvSpPr>
+        <p:spPr>
+          <a:xfrm>
+            <a:off x="10973201" y="2695813"/>
+            <a:ext cx="765110" cy="261610"/>
+          </a:xfrm>
+          <a:prstGeom prst="rect">
+            <a:avLst/>
+          </a:prstGeom>
+          <a:noFill/>
+        </p:spPr>
+        <p:txBody>
+          <a:bodyPr wrap="square" rtlCol="0">
+            <a:spAutoFit/>
+          </a:bodyPr>
+          <a:lstStyle/>
+          <a:p>
+            <a:pPr algn="ctr"/>
+            <a:r>
+              <a:rPr lang="en-US" sz="1050" dirty="0"/>
+              <a:t>60%</a:t>
+            </a:r>
+          </a:p>
+        </p:txBody>
+      </p:sp>
+      <p:sp>
+        <p:nvSpPr>
+          <p:cNvPr id="32" name="TextBox 31">
+            <a:extLst>
+              <a:ext uri="{FF2B5EF4-FFF2-40B4-BE49-F238E27FC236}">
+                <a16:creationId xmlns:a16="http://schemas.microsoft.com/office/drawing/2014/main" id="{88BF5D07-155D-1078-43BE-51C80EECE36C}"/>
+              </a:ext>
+            </a:extLst>
+          </p:cNvPr>
+          <p:cNvSpPr txBox="1"/>
+          <p:nvPr/>
+        </p:nvSpPr>
+        <p:spPr>
+          <a:xfrm>
+            <a:off x="8231486" y="681130"/>
+            <a:ext cx="765110" cy="261610"/>
+          </a:xfrm>
+          <a:prstGeom prst="rect">
+            <a:avLst/>
+          </a:prstGeom>
+          <a:noFill/>
+        </p:spPr>
+        <p:txBody>
+          <a:bodyPr wrap="square" rtlCol="0">
+            <a:spAutoFit/>
+          </a:bodyPr>
+          <a:lstStyle/>
+          <a:p>
+            <a:pPr algn="ctr"/>
+            <a:r>
+              <a:rPr lang="en-US" sz="1050" dirty="0"/>
+              <a:t>Feathers</a:t>
+            </a:r>
+          </a:p>
+        </p:txBody>
+      </p:sp>
+      <p:sp>
+        <p:nvSpPr>
+          <p:cNvPr id="33" name="TextBox 32">
+            <a:extLst>
+              <a:ext uri="{FF2B5EF4-FFF2-40B4-BE49-F238E27FC236}">
+                <a16:creationId xmlns:a16="http://schemas.microsoft.com/office/drawing/2014/main" id="{07F96008-7372-07DF-41D0-972FBABAB6F7}"/>
+              </a:ext>
+            </a:extLst>
+          </p:cNvPr>
+          <p:cNvSpPr txBox="1"/>
+          <p:nvPr/>
+        </p:nvSpPr>
+        <p:spPr>
+          <a:xfrm>
+            <a:off x="10054392" y="676941"/>
+            <a:ext cx="765110" cy="261610"/>
+          </a:xfrm>
+          <a:prstGeom prst="rect">
+            <a:avLst/>
+          </a:prstGeom>
+          <a:noFill/>
+        </p:spPr>
+        <p:txBody>
+          <a:bodyPr wrap="square" rtlCol="0">
+            <a:spAutoFit/>
+          </a:bodyPr>
+          <a:lstStyle/>
+          <a:p>
+            <a:pPr algn="ctr"/>
+            <a:r>
+              <a:rPr lang="en-US" sz="1050" dirty="0"/>
+              <a:t>Label</a:t>
+            </a:r>
+          </a:p>
+        </p:txBody>
+      </p:sp>
+      <p:sp>
+        <p:nvSpPr>
+          <p:cNvPr id="34" name="TextBox 33">
+            <a:extLst>
+              <a:ext uri="{FF2B5EF4-FFF2-40B4-BE49-F238E27FC236}">
+                <a16:creationId xmlns:a16="http://schemas.microsoft.com/office/drawing/2014/main" id="{105B9F87-C989-4CD8-C658-A21583C21D19}"/>
+              </a:ext>
+            </a:extLst>
+          </p:cNvPr>
+          <p:cNvSpPr txBox="1"/>
+          <p:nvPr/>
+        </p:nvSpPr>
+        <p:spPr>
+          <a:xfrm>
+            <a:off x="8096469" y="2479149"/>
+            <a:ext cx="1159805" cy="369332"/>
+          </a:xfrm>
+          <a:prstGeom prst="rect">
+            <a:avLst/>
+          </a:prstGeom>
+          <a:noFill/>
+        </p:spPr>
+        <p:txBody>
+          <a:bodyPr wrap="square" rtlCol="0">
+            <a:spAutoFit/>
+          </a:bodyPr>
+          <a:lstStyle/>
+          <a:p>
+            <a:pPr algn="ctr"/>
+            <a:r>
+              <a:rPr lang="en-US" dirty="0" err="1"/>
+              <a:t>X_train</a:t>
+            </a:r>
+            <a:endParaRPr lang="en-US" dirty="0"/>
+          </a:p>
+        </p:txBody>
+      </p:sp>
+      <p:sp>
+        <p:nvSpPr>
+          <p:cNvPr id="35" name="TextBox 34">
+            <a:extLst>
+              <a:ext uri="{FF2B5EF4-FFF2-40B4-BE49-F238E27FC236}">
+                <a16:creationId xmlns:a16="http://schemas.microsoft.com/office/drawing/2014/main" id="{A6152336-CAFE-E710-3A40-C1BCFAAA96E9}"/>
+              </a:ext>
+            </a:extLst>
+          </p:cNvPr>
+          <p:cNvSpPr txBox="1"/>
+          <p:nvPr/>
+        </p:nvSpPr>
+        <p:spPr>
+          <a:xfrm rot="5400000">
+            <a:off x="9852163" y="2511147"/>
+            <a:ext cx="1159805" cy="369332"/>
+          </a:xfrm>
+          <a:prstGeom prst="rect">
+            <a:avLst/>
+          </a:prstGeom>
+          <a:noFill/>
+        </p:spPr>
+        <p:txBody>
+          <a:bodyPr wrap="square" rtlCol="0">
+            <a:spAutoFit/>
+          </a:bodyPr>
+          <a:lstStyle/>
+          <a:p>
+            <a:pPr algn="ctr"/>
+            <a:r>
+              <a:rPr lang="en-US" dirty="0" err="1"/>
+              <a:t>y_test</a:t>
+            </a:r>
+            <a:endParaRPr lang="en-US" dirty="0"/>
+          </a:p>
+        </p:txBody>
+      </p:sp>
+      <p:sp>
+        <p:nvSpPr>
+          <p:cNvPr id="36" name="TextBox 35">
+            <a:extLst>
+              <a:ext uri="{FF2B5EF4-FFF2-40B4-BE49-F238E27FC236}">
+                <a16:creationId xmlns:a16="http://schemas.microsoft.com/office/drawing/2014/main" id="{A1222ABC-9DE0-2589-81F7-88D53256BA59}"/>
+              </a:ext>
+            </a:extLst>
+          </p:cNvPr>
+          <p:cNvSpPr txBox="1"/>
+          <p:nvPr/>
+        </p:nvSpPr>
+        <p:spPr>
+          <a:xfrm>
+            <a:off x="8096469" y="4055994"/>
+            <a:ext cx="1159805" cy="369332"/>
+          </a:xfrm>
+          <a:prstGeom prst="rect">
+            <a:avLst/>
+          </a:prstGeom>
+          <a:noFill/>
+        </p:spPr>
+        <p:txBody>
+          <a:bodyPr wrap="square" rtlCol="0">
+            <a:spAutoFit/>
+          </a:bodyPr>
+          <a:lstStyle/>
+          <a:p>
+            <a:pPr algn="ctr"/>
+            <a:r>
+              <a:rPr lang="en-US" dirty="0" err="1"/>
+              <a:t>X_val</a:t>
+            </a:r>
+            <a:endParaRPr lang="en-US" dirty="0"/>
+          </a:p>
+        </p:txBody>
+      </p:sp>
+      <p:sp>
+        <p:nvSpPr>
+          <p:cNvPr id="37" name="TextBox 36">
+            <a:extLst>
+              <a:ext uri="{FF2B5EF4-FFF2-40B4-BE49-F238E27FC236}">
+                <a16:creationId xmlns:a16="http://schemas.microsoft.com/office/drawing/2014/main" id="{137FA6FB-6549-BFA0-1A9D-AE14FB6370A0}"/>
+              </a:ext>
+            </a:extLst>
+          </p:cNvPr>
+          <p:cNvSpPr txBox="1"/>
+          <p:nvPr/>
+        </p:nvSpPr>
+        <p:spPr>
+          <a:xfrm>
+            <a:off x="9852162" y="4059893"/>
+            <a:ext cx="1159805" cy="369332"/>
+          </a:xfrm>
+          <a:prstGeom prst="rect">
+            <a:avLst/>
+          </a:prstGeom>
+          <a:noFill/>
+        </p:spPr>
+        <p:txBody>
+          <a:bodyPr wrap="square" rtlCol="0">
+            <a:spAutoFit/>
+          </a:bodyPr>
+          <a:lstStyle/>
+          <a:p>
+            <a:pPr algn="ctr"/>
+            <a:r>
+              <a:rPr lang="en-US" dirty="0" err="1"/>
+              <a:t>y_val</a:t>
+            </a:r>
+            <a:endParaRPr lang="en-US" dirty="0"/>
+          </a:p>
+        </p:txBody>
+      </p:sp>
+      <p:sp>
+        <p:nvSpPr>
+          <p:cNvPr id="38" name="TextBox 37">
+            <a:extLst>
+              <a:ext uri="{FF2B5EF4-FFF2-40B4-BE49-F238E27FC236}">
+                <a16:creationId xmlns:a16="http://schemas.microsoft.com/office/drawing/2014/main" id="{E1C4943A-AFC0-EE63-8170-141DD79273B3}"/>
+              </a:ext>
+            </a:extLst>
+          </p:cNvPr>
+          <p:cNvSpPr txBox="1"/>
+          <p:nvPr/>
+        </p:nvSpPr>
+        <p:spPr>
+          <a:xfrm>
+            <a:off x="8096469" y="4825368"/>
+            <a:ext cx="1159805" cy="369332"/>
+          </a:xfrm>
+          <a:prstGeom prst="rect">
+            <a:avLst/>
+          </a:prstGeom>
+          <a:noFill/>
+        </p:spPr>
+        <p:txBody>
+          <a:bodyPr wrap="square" rtlCol="0">
+            <a:spAutoFit/>
+          </a:bodyPr>
+          <a:lstStyle/>
+          <a:p>
+            <a:pPr algn="ctr"/>
+            <a:r>
+              <a:rPr lang="en-US" dirty="0" err="1"/>
+              <a:t>X_test</a:t>
+            </a:r>
+            <a:endParaRPr lang="en-US" dirty="0"/>
+          </a:p>
+        </p:txBody>
+      </p:sp>
+      <p:sp>
+        <p:nvSpPr>
+          <p:cNvPr id="39" name="TextBox 38">
+            <a:extLst>
+              <a:ext uri="{FF2B5EF4-FFF2-40B4-BE49-F238E27FC236}">
+                <a16:creationId xmlns:a16="http://schemas.microsoft.com/office/drawing/2014/main" id="{BE92E91D-D162-BB06-81FD-F34DAC7FEDB7}"/>
+              </a:ext>
+            </a:extLst>
+          </p:cNvPr>
+          <p:cNvSpPr txBox="1"/>
+          <p:nvPr/>
+        </p:nvSpPr>
+        <p:spPr>
+          <a:xfrm>
+            <a:off x="9852161" y="4820406"/>
+            <a:ext cx="1159805" cy="369332"/>
+          </a:xfrm>
+          <a:prstGeom prst="rect">
+            <a:avLst/>
+          </a:prstGeom>
+          <a:noFill/>
+        </p:spPr>
+        <p:txBody>
+          <a:bodyPr wrap="square" rtlCol="0">
+            <a:spAutoFit/>
+          </a:bodyPr>
+          <a:lstStyle/>
+          <a:p>
+            <a:pPr algn="ctr"/>
+            <a:r>
+              <a:rPr lang="en-US" dirty="0" err="1"/>
+              <a:t>y_test</a:t>
+            </a:r>
+            <a:endParaRPr lang="en-US" dirty="0"/>
+          </a:p>
+        </p:txBody>
+      </p:sp>
+      <p:sp>
+        <p:nvSpPr>
+          <p:cNvPr id="40" name="Arrow: Right 39">
+            <a:extLst>
+              <a:ext uri="{FF2B5EF4-FFF2-40B4-BE49-F238E27FC236}">
+                <a16:creationId xmlns:a16="http://schemas.microsoft.com/office/drawing/2014/main" id="{EA816166-3D2F-FDAA-EBD0-C785364E915A}"/>
+              </a:ext>
+            </a:extLst>
+          </p:cNvPr>
+          <p:cNvSpPr/>
+          <p:nvPr/>
+        </p:nvSpPr>
+        <p:spPr>
+          <a:xfrm>
+            <a:off x="4368388" y="3096586"/>
+            <a:ext cx="1159806" cy="664821"/>
+          </a:xfrm>
+          <a:prstGeom prst="rightArrow">
+            <a:avLst/>
+          </a:prstGeom>
+        </p:spPr>
+        <p:style>
+          <a:lnRef idx="2">
+            <a:schemeClr val="accent1">
+              <a:shade val="15000"/>
+            </a:schemeClr>
+          </a:lnRef>
+          <a:fillRef idx="1">
+            <a:schemeClr val="accent1"/>
+          </a:fillRef>
+          <a:effectRef idx="0">
+            <a:schemeClr val="accent1"/>
+          </a:effectRef>
+          <a:fontRef idx="minor">
+            <a:schemeClr val="lt1"/>
+          </a:fontRef>
+        </p:style>
+        <p:txBody>
+          <a:bodyPr rtlCol="0" anchor="ctr"/>
+          <a:lstStyle/>
+          <a:p>
+            <a:pPr algn="ctr"/>
+            <a:r>
+              <a:rPr lang="en-US" dirty="0"/>
+              <a:t>Split</a:t>
             </a:r>
           </a:p>
         </p:txBody>
@@ -18303,7 +22316,7 @@
     </p:spTree>
     <p:extLst>
       <p:ext uri="{BB962C8B-B14F-4D97-AF65-F5344CB8AC3E}">
-        <p14:creationId xmlns:p14="http://schemas.microsoft.com/office/powerpoint/2010/main" val="504658541"/>
+        <p14:creationId xmlns:p14="http://schemas.microsoft.com/office/powerpoint/2010/main" val="1494790907"/>
       </p:ext>
     </p:extLst>
   </p:cSld>

</xml_diff>